<commit_message>
final version of improved...
</commit_message>
<xml_diff>
--- a/paper/paper.pptx
+++ b/paper/paper.pptx
@@ -8,6 +8,8 @@
     <p:sldId id="256" r:id="rId2"/>
     <p:sldId id="257" r:id="rId3"/>
     <p:sldId id="258" r:id="rId4"/>
+    <p:sldId id="259" r:id="rId5"/>
+    <p:sldId id="260" r:id="rId6"/>
   </p:sldIdLst>
   <p:sldSz cx="12192000" cy="6858000"/>
   <p:notesSz cx="6858000" cy="9144000"/>
@@ -245,7 +247,7 @@
           <a:p>
             <a:fld id="{F3636808-8999-4AAE-88AA-BF8F5B22E041}" type="datetimeFigureOut">
               <a:rPr lang="en-US" smtClean="0"/>
-              <a:t>5/29/2014</a:t>
+              <a:t>6/21/2014</a:t>
             </a:fld>
             <a:endParaRPr lang="en-US"/>
           </a:p>
@@ -415,7 +417,7 @@
           <a:p>
             <a:fld id="{F3636808-8999-4AAE-88AA-BF8F5B22E041}" type="datetimeFigureOut">
               <a:rPr lang="en-US" smtClean="0"/>
-              <a:t>5/29/2014</a:t>
+              <a:t>6/21/2014</a:t>
             </a:fld>
             <a:endParaRPr lang="en-US"/>
           </a:p>
@@ -595,7 +597,7 @@
           <a:p>
             <a:fld id="{F3636808-8999-4AAE-88AA-BF8F5B22E041}" type="datetimeFigureOut">
               <a:rPr lang="en-US" smtClean="0"/>
-              <a:t>5/29/2014</a:t>
+              <a:t>6/21/2014</a:t>
             </a:fld>
             <a:endParaRPr lang="en-US"/>
           </a:p>
@@ -765,7 +767,7 @@
           <a:p>
             <a:fld id="{F3636808-8999-4AAE-88AA-BF8F5B22E041}" type="datetimeFigureOut">
               <a:rPr lang="en-US" smtClean="0"/>
-              <a:t>5/29/2014</a:t>
+              <a:t>6/21/2014</a:t>
             </a:fld>
             <a:endParaRPr lang="en-US"/>
           </a:p>
@@ -1011,7 +1013,7 @@
           <a:p>
             <a:fld id="{F3636808-8999-4AAE-88AA-BF8F5B22E041}" type="datetimeFigureOut">
               <a:rPr lang="en-US" smtClean="0"/>
-              <a:t>5/29/2014</a:t>
+              <a:t>6/21/2014</a:t>
             </a:fld>
             <a:endParaRPr lang="en-US"/>
           </a:p>
@@ -1243,7 +1245,7 @@
           <a:p>
             <a:fld id="{F3636808-8999-4AAE-88AA-BF8F5B22E041}" type="datetimeFigureOut">
               <a:rPr lang="en-US" smtClean="0"/>
-              <a:t>5/29/2014</a:t>
+              <a:t>6/21/2014</a:t>
             </a:fld>
             <a:endParaRPr lang="en-US"/>
           </a:p>
@@ -1610,7 +1612,7 @@
           <a:p>
             <a:fld id="{F3636808-8999-4AAE-88AA-BF8F5B22E041}" type="datetimeFigureOut">
               <a:rPr lang="en-US" smtClean="0"/>
-              <a:t>5/29/2014</a:t>
+              <a:t>6/21/2014</a:t>
             </a:fld>
             <a:endParaRPr lang="en-US"/>
           </a:p>
@@ -1728,7 +1730,7 @@
           <a:p>
             <a:fld id="{F3636808-8999-4AAE-88AA-BF8F5B22E041}" type="datetimeFigureOut">
               <a:rPr lang="en-US" smtClean="0"/>
-              <a:t>5/29/2014</a:t>
+              <a:t>6/21/2014</a:t>
             </a:fld>
             <a:endParaRPr lang="en-US"/>
           </a:p>
@@ -1823,7 +1825,7 @@
           <a:p>
             <a:fld id="{F3636808-8999-4AAE-88AA-BF8F5B22E041}" type="datetimeFigureOut">
               <a:rPr lang="en-US" smtClean="0"/>
-              <a:t>5/29/2014</a:t>
+              <a:t>6/21/2014</a:t>
             </a:fld>
             <a:endParaRPr lang="en-US"/>
           </a:p>
@@ -2100,7 +2102,7 @@
           <a:p>
             <a:fld id="{F3636808-8999-4AAE-88AA-BF8F5B22E041}" type="datetimeFigureOut">
               <a:rPr lang="en-US" smtClean="0"/>
-              <a:t>5/29/2014</a:t>
+              <a:t>6/21/2014</a:t>
             </a:fld>
             <a:endParaRPr lang="en-US"/>
           </a:p>
@@ -2353,7 +2355,7 @@
           <a:p>
             <a:fld id="{F3636808-8999-4AAE-88AA-BF8F5B22E041}" type="datetimeFigureOut">
               <a:rPr lang="en-US" smtClean="0"/>
-              <a:t>5/29/2014</a:t>
+              <a:t>6/21/2014</a:t>
             </a:fld>
             <a:endParaRPr lang="en-US"/>
           </a:p>
@@ -2566,7 +2568,7 @@
           <a:p>
             <a:fld id="{F3636808-8999-4AAE-88AA-BF8F5B22E041}" type="datetimeFigureOut">
               <a:rPr lang="en-US" smtClean="0"/>
-              <a:t>5/29/2014</a:t>
+              <a:t>6/21/2014</a:t>
             </a:fld>
             <a:endParaRPr lang="en-US"/>
           </a:p>
@@ -11520,6 +11522,2453 @@
 </p:sld>
 </file>
 
+<file path=ppt/slides/slide4.xml><?xml version="1.0" encoding="utf-8"?>
+<p:sld xmlns:a="http://schemas.openxmlformats.org/drawingml/2006/main" xmlns:r="http://schemas.openxmlformats.org/officeDocument/2006/relationships" xmlns:p="http://schemas.openxmlformats.org/presentationml/2006/main">
+  <p:cSld>
+    <p:spTree>
+      <p:nvGrpSpPr>
+        <p:cNvPr id="1" name=""/>
+        <p:cNvGrpSpPr/>
+        <p:nvPr/>
+      </p:nvGrpSpPr>
+      <p:grpSpPr>
+        <a:xfrm>
+          <a:off x="0" y="0"/>
+          <a:ext cx="0" cy="0"/>
+          <a:chOff x="0" y="0"/>
+          <a:chExt cx="0" cy="0"/>
+        </a:xfrm>
+      </p:grpSpPr>
+      <mc:AlternateContent xmlns:mc="http://schemas.openxmlformats.org/markup-compatibility/2006">
+        <mc:Choice xmlns:a14="http://schemas.microsoft.com/office/drawing/2010/main" Requires="a14">
+          <p:sp>
+            <p:nvSpPr>
+              <p:cNvPr id="6" name="Rectangle 5"/>
+              <p:cNvSpPr/>
+              <p:nvPr/>
+            </p:nvSpPr>
+            <p:spPr>
+              <a:xfrm>
+                <a:off x="2608849" y="606750"/>
+                <a:ext cx="847631" cy="2700472"/>
+              </a:xfrm>
+              <a:prstGeom prst="rect">
+                <a:avLst/>
+              </a:prstGeom>
+              <a:solidFill>
+                <a:schemeClr val="bg1"/>
+              </a:solidFill>
+            </p:spPr>
+            <p:style>
+              <a:lnRef idx="2">
+                <a:schemeClr val="accent1">
+                  <a:shade val="50000"/>
+                </a:schemeClr>
+              </a:lnRef>
+              <a:fillRef idx="1">
+                <a:schemeClr val="accent1"/>
+              </a:fillRef>
+              <a:effectRef idx="0">
+                <a:schemeClr val="accent1"/>
+              </a:effectRef>
+              <a:fontRef idx="minor">
+                <a:schemeClr val="lt1"/>
+              </a:fontRef>
+            </p:style>
+            <p:txBody>
+              <a:bodyPr rtlCol="0" anchor="ctr"/>
+              <a:lstStyle/>
+              <a:p>
+                <a:pPr algn="ctr"/>
+                <a14:m>
+                  <m:oMathPara xmlns:m="http://schemas.openxmlformats.org/officeDocument/2006/math">
+                    <m:oMathParaPr>
+                      <m:jc m:val="centerGroup"/>
+                    </m:oMathParaPr>
+                    <m:oMath xmlns:m="http://schemas.openxmlformats.org/officeDocument/2006/math">
+                      <m:r>
+                        <a:rPr lang="en-US" sz="1600" b="0" i="1" smtClean="0">
+                          <a:solidFill>
+                            <a:schemeClr val="tx1"/>
+                          </a:solidFill>
+                          <a:latin typeface="Cambria Math" panose="02040503050406030204" pitchFamily="18" charset="0"/>
+                        </a:rPr>
+                        <m:t>000001</m:t>
+                      </m:r>
+                    </m:oMath>
+                  </m:oMathPara>
+                </a14:m>
+                <a:endParaRPr lang="en-US" sz="1600" b="0" dirty="0" smtClean="0">
+                  <a:solidFill>
+                    <a:schemeClr val="tx1"/>
+                  </a:solidFill>
+                </a:endParaRPr>
+              </a:p>
+              <a:p>
+                <a:pPr algn="ctr"/>
+                <a14:m>
+                  <m:oMathPara xmlns:m="http://schemas.openxmlformats.org/officeDocument/2006/math">
+                    <m:oMathParaPr>
+                      <m:jc m:val="centerGroup"/>
+                    </m:oMathParaPr>
+                    <m:oMath xmlns:m="http://schemas.openxmlformats.org/officeDocument/2006/math">
+                      <m:r>
+                        <a:rPr lang="en-US" sz="1600" b="0" i="1" smtClean="0">
+                          <a:solidFill>
+                            <a:schemeClr val="tx1"/>
+                          </a:solidFill>
+                          <a:latin typeface="Cambria Math" panose="02040503050406030204" pitchFamily="18" charset="0"/>
+                        </a:rPr>
+                        <m:t>000011</m:t>
+                      </m:r>
+                    </m:oMath>
+                  </m:oMathPara>
+                </a14:m>
+                <a:endParaRPr lang="en-US" sz="1600" b="0" dirty="0" smtClean="0">
+                  <a:solidFill>
+                    <a:schemeClr val="tx1"/>
+                  </a:solidFill>
+                </a:endParaRPr>
+              </a:p>
+              <a:p>
+                <a:pPr algn="ctr"/>
+                <a14:m>
+                  <m:oMathPara xmlns:m="http://schemas.openxmlformats.org/officeDocument/2006/math">
+                    <m:oMathParaPr>
+                      <m:jc m:val="centerGroup"/>
+                    </m:oMathParaPr>
+                    <m:oMath xmlns:m="http://schemas.openxmlformats.org/officeDocument/2006/math">
+                      <m:r>
+                        <a:rPr lang="en-US" sz="1600" b="0" i="1" smtClean="0">
+                          <a:solidFill>
+                            <a:schemeClr val="tx1"/>
+                          </a:solidFill>
+                          <a:latin typeface="Cambria Math" panose="02040503050406030204" pitchFamily="18" charset="0"/>
+                        </a:rPr>
+                        <m:t>000110</m:t>
+                      </m:r>
+                    </m:oMath>
+                  </m:oMathPara>
+                </a14:m>
+                <a:endParaRPr lang="en-US" sz="1600" b="0" dirty="0" smtClean="0">
+                  <a:solidFill>
+                    <a:schemeClr val="tx1"/>
+                  </a:solidFill>
+                </a:endParaRPr>
+              </a:p>
+              <a:p>
+                <a:pPr algn="ctr"/>
+                <a14:m>
+                  <m:oMathPara xmlns:m="http://schemas.openxmlformats.org/officeDocument/2006/math">
+                    <m:oMathParaPr>
+                      <m:jc m:val="centerGroup"/>
+                    </m:oMathParaPr>
+                    <m:oMath xmlns:m="http://schemas.openxmlformats.org/officeDocument/2006/math">
+                      <m:r>
+                        <a:rPr lang="en-US" sz="1600" b="0" i="1" smtClean="0">
+                          <a:solidFill>
+                            <a:schemeClr val="tx1"/>
+                          </a:solidFill>
+                          <a:latin typeface="Cambria Math" panose="02040503050406030204" pitchFamily="18" charset="0"/>
+                        </a:rPr>
+                        <m:t>000111</m:t>
+                      </m:r>
+                    </m:oMath>
+                  </m:oMathPara>
+                </a14:m>
+                <a:endParaRPr lang="en-US" sz="1600" b="0" dirty="0" smtClean="0">
+                  <a:solidFill>
+                    <a:schemeClr val="tx1"/>
+                  </a:solidFill>
+                </a:endParaRPr>
+              </a:p>
+              <a:p>
+                <a:pPr algn="ctr"/>
+                <a14:m>
+                  <m:oMathPara xmlns:m="http://schemas.openxmlformats.org/officeDocument/2006/math">
+                    <m:oMathParaPr>
+                      <m:jc m:val="centerGroup"/>
+                    </m:oMathParaPr>
+                    <m:oMath xmlns:m="http://schemas.openxmlformats.org/officeDocument/2006/math">
+                      <m:r>
+                        <a:rPr lang="en-US" sz="1600" b="0" i="1" smtClean="0">
+                          <a:solidFill>
+                            <a:schemeClr val="tx1"/>
+                          </a:solidFill>
+                          <a:latin typeface="Cambria Math" panose="02040503050406030204" pitchFamily="18" charset="0"/>
+                        </a:rPr>
+                        <m:t>011000</m:t>
+                      </m:r>
+                    </m:oMath>
+                  </m:oMathPara>
+                </a14:m>
+                <a:endParaRPr lang="en-US" sz="1600" b="0" dirty="0" smtClean="0">
+                  <a:solidFill>
+                    <a:schemeClr val="tx1"/>
+                  </a:solidFill>
+                </a:endParaRPr>
+              </a:p>
+              <a:p>
+                <a:pPr algn="ctr"/>
+                <a:r>
+                  <a:rPr lang="en-US" sz="1600" dirty="0" smtClean="0">
+                    <a:solidFill>
+                      <a:schemeClr val="tx1"/>
+                    </a:solidFill>
+                  </a:rPr>
+                  <a:t>100010</a:t>
+                </a:r>
+              </a:p>
+              <a:p>
+                <a:pPr algn="ctr"/>
+                <a:r>
+                  <a:rPr lang="en-US" sz="1600" dirty="0" smtClean="0">
+                    <a:solidFill>
+                      <a:schemeClr val="tx1"/>
+                    </a:solidFill>
+                  </a:rPr>
+                  <a:t>100111</a:t>
+                </a:r>
+                <a:endParaRPr lang="en-US" sz="1600" dirty="0">
+                  <a:solidFill>
+                    <a:schemeClr val="tx1"/>
+                  </a:solidFill>
+                </a:endParaRPr>
+              </a:p>
+            </p:txBody>
+          </p:sp>
+        </mc:Choice>
+        <mc:Fallback>
+          <p:sp>
+            <p:nvSpPr>
+              <p:cNvPr id="6" name="Rectangle 5"/>
+              <p:cNvSpPr>
+                <a:spLocks noRot="1" noChangeAspect="1" noMove="1" noResize="1" noEditPoints="1" noAdjustHandles="1" noChangeArrowheads="1" noChangeShapeType="1" noTextEdit="1"/>
+              </p:cNvSpPr>
+              <p:nvPr/>
+            </p:nvSpPr>
+            <p:spPr>
+              <a:xfrm>
+                <a:off x="2608849" y="606750"/>
+                <a:ext cx="847631" cy="2700472"/>
+              </a:xfrm>
+              <a:prstGeom prst="rect">
+                <a:avLst/>
+              </a:prstGeom>
+              <a:blipFill rotWithShape="0">
+                <a:blip r:embed="rId2"/>
+                <a:stretch>
+                  <a:fillRect l="-4255"/>
+                </a:stretch>
+              </a:blipFill>
+            </p:spPr>
+            <p:txBody>
+              <a:bodyPr/>
+              <a:lstStyle/>
+              <a:p>
+                <a:r>
+                  <a:rPr lang="en-US">
+                    <a:noFill/>
+                  </a:rPr>
+                  <a:t> </a:t>
+                </a:r>
+              </a:p>
+            </p:txBody>
+          </p:sp>
+        </mc:Fallback>
+      </mc:AlternateContent>
+      <mc:AlternateContent xmlns:mc="http://schemas.openxmlformats.org/markup-compatibility/2006">
+        <mc:Choice xmlns:a14="http://schemas.microsoft.com/office/drawing/2010/main" Requires="a14">
+          <p:sp>
+            <p:nvSpPr>
+              <p:cNvPr id="8" name="Rectangle 7"/>
+              <p:cNvSpPr/>
+              <p:nvPr/>
+            </p:nvSpPr>
+            <p:spPr>
+              <a:xfrm>
+                <a:off x="1323173" y="606750"/>
+                <a:ext cx="850607" cy="2700472"/>
+              </a:xfrm>
+              <a:prstGeom prst="rect">
+                <a:avLst/>
+              </a:prstGeom>
+              <a:solidFill>
+                <a:schemeClr val="bg1"/>
+              </a:solidFill>
+            </p:spPr>
+            <p:style>
+              <a:lnRef idx="2">
+                <a:schemeClr val="accent1">
+                  <a:shade val="50000"/>
+                </a:schemeClr>
+              </a:lnRef>
+              <a:fillRef idx="1">
+                <a:schemeClr val="accent1"/>
+              </a:fillRef>
+              <a:effectRef idx="0">
+                <a:schemeClr val="accent1"/>
+              </a:effectRef>
+              <a:fontRef idx="minor">
+                <a:schemeClr val="lt1"/>
+              </a:fontRef>
+            </p:style>
+            <p:txBody>
+              <a:bodyPr rtlCol="0" anchor="ctr"/>
+              <a:lstStyle/>
+              <a:p>
+                <a:pPr algn="ctr"/>
+                <a:r>
+                  <a:rPr lang="en-US" sz="1600" dirty="0" smtClean="0">
+                    <a:solidFill>
+                      <a:schemeClr val="tx1"/>
+                    </a:solidFill>
+                  </a:rPr>
+                  <a:t>100010</a:t>
+                </a:r>
+                <a:endParaRPr lang="en-US" sz="1600" b="0" i="1" dirty="0" smtClean="0">
+                  <a:solidFill>
+                    <a:schemeClr val="tx1"/>
+                  </a:solidFill>
+                  <a:latin typeface="Cambria Math" panose="02040503050406030204" pitchFamily="18" charset="0"/>
+                </a:endParaRPr>
+              </a:p>
+              <a:p>
+                <a:pPr algn="ctr"/>
+                <a14:m>
+                  <m:oMathPara xmlns:m="http://schemas.openxmlformats.org/officeDocument/2006/math">
+                    <m:oMathParaPr>
+                      <m:jc m:val="centerGroup"/>
+                    </m:oMathParaPr>
+                    <m:oMath xmlns:m="http://schemas.openxmlformats.org/officeDocument/2006/math">
+                      <m:r>
+                        <a:rPr lang="en-US" sz="1600" b="0" i="1" smtClean="0">
+                          <a:solidFill>
+                            <a:schemeClr val="tx1"/>
+                          </a:solidFill>
+                          <a:latin typeface="Cambria Math" panose="02040503050406030204" pitchFamily="18" charset="0"/>
+                        </a:rPr>
+                        <m:t>000001</m:t>
+                      </m:r>
+                    </m:oMath>
+                  </m:oMathPara>
+                </a14:m>
+                <a:endParaRPr lang="en-US" sz="1600" b="0" dirty="0" smtClean="0">
+                  <a:solidFill>
+                    <a:schemeClr val="tx1"/>
+                  </a:solidFill>
+                </a:endParaRPr>
+              </a:p>
+              <a:p>
+                <a:pPr algn="ctr"/>
+                <a14:m>
+                  <m:oMathPara xmlns:m="http://schemas.openxmlformats.org/officeDocument/2006/math">
+                    <m:oMathParaPr>
+                      <m:jc m:val="centerGroup"/>
+                    </m:oMathParaPr>
+                    <m:oMath xmlns:m="http://schemas.openxmlformats.org/officeDocument/2006/math">
+                      <m:r>
+                        <a:rPr lang="en-US" sz="1600" b="0" i="1" smtClean="0">
+                          <a:solidFill>
+                            <a:schemeClr val="tx1"/>
+                          </a:solidFill>
+                          <a:latin typeface="Cambria Math" panose="02040503050406030204" pitchFamily="18" charset="0"/>
+                        </a:rPr>
+                        <m:t>000110</m:t>
+                      </m:r>
+                    </m:oMath>
+                  </m:oMathPara>
+                </a14:m>
+                <a:endParaRPr lang="en-US" sz="1600" b="0" dirty="0" smtClean="0">
+                  <a:solidFill>
+                    <a:schemeClr val="tx1"/>
+                  </a:solidFill>
+                </a:endParaRPr>
+              </a:p>
+              <a:p>
+                <a:pPr algn="ctr"/>
+                <a14:m>
+                  <m:oMathPara xmlns:m="http://schemas.openxmlformats.org/officeDocument/2006/math">
+                    <m:oMathParaPr>
+                      <m:jc m:val="centerGroup"/>
+                    </m:oMathParaPr>
+                    <m:oMath xmlns:m="http://schemas.openxmlformats.org/officeDocument/2006/math">
+                      <m:r>
+                        <a:rPr lang="en-US" sz="1600" b="0" i="1" smtClean="0">
+                          <a:solidFill>
+                            <a:schemeClr val="tx1"/>
+                          </a:solidFill>
+                          <a:latin typeface="Cambria Math" panose="02040503050406030204" pitchFamily="18" charset="0"/>
+                        </a:rPr>
+                        <m:t>000111</m:t>
+                      </m:r>
+                    </m:oMath>
+                  </m:oMathPara>
+                </a14:m>
+                <a:endParaRPr lang="en-US" sz="1600" b="0" dirty="0" smtClean="0">
+                  <a:solidFill>
+                    <a:schemeClr val="tx1"/>
+                  </a:solidFill>
+                </a:endParaRPr>
+              </a:p>
+              <a:p>
+                <a:pPr algn="ctr"/>
+                <a14:m>
+                  <m:oMathPara xmlns:m="http://schemas.openxmlformats.org/officeDocument/2006/math">
+                    <m:oMathParaPr>
+                      <m:jc m:val="centerGroup"/>
+                    </m:oMathParaPr>
+                    <m:oMath xmlns:m="http://schemas.openxmlformats.org/officeDocument/2006/math">
+                      <m:r>
+                        <a:rPr lang="en-US" sz="1600" b="0" i="1" smtClean="0">
+                          <a:solidFill>
+                            <a:schemeClr val="tx1"/>
+                          </a:solidFill>
+                          <a:latin typeface="Cambria Math" panose="02040503050406030204" pitchFamily="18" charset="0"/>
+                        </a:rPr>
+                        <m:t>011000</m:t>
+                      </m:r>
+                    </m:oMath>
+                  </m:oMathPara>
+                </a14:m>
+                <a:endParaRPr lang="en-US" sz="1600" b="0" dirty="0" smtClean="0">
+                  <a:solidFill>
+                    <a:schemeClr val="tx1"/>
+                  </a:solidFill>
+                </a:endParaRPr>
+              </a:p>
+              <a:p>
+                <a:pPr algn="ctr"/>
+                <a14:m>
+                  <m:oMathPara xmlns:m="http://schemas.openxmlformats.org/officeDocument/2006/math">
+                    <m:oMathParaPr>
+                      <m:jc m:val="centerGroup"/>
+                    </m:oMathParaPr>
+                    <m:oMath xmlns:m="http://schemas.openxmlformats.org/officeDocument/2006/math">
+                      <m:r>
+                        <a:rPr lang="en-US" sz="1600" i="1">
+                          <a:solidFill>
+                            <a:schemeClr val="tx1"/>
+                          </a:solidFill>
+                          <a:latin typeface="Cambria Math" panose="02040503050406030204" pitchFamily="18" charset="0"/>
+                        </a:rPr>
+                        <m:t>000011</m:t>
+                      </m:r>
+                    </m:oMath>
+                  </m:oMathPara>
+                </a14:m>
+                <a:endParaRPr lang="en-US" sz="1600" dirty="0" smtClean="0">
+                  <a:solidFill>
+                    <a:schemeClr val="tx1"/>
+                  </a:solidFill>
+                </a:endParaRPr>
+              </a:p>
+              <a:p>
+                <a:pPr algn="ctr"/>
+                <a:r>
+                  <a:rPr lang="en-US" sz="1600" dirty="0">
+                    <a:solidFill>
+                      <a:schemeClr val="tx1"/>
+                    </a:solidFill>
+                  </a:rPr>
+                  <a:t>100111</a:t>
+                </a:r>
+              </a:p>
+              <a:p>
+                <a:pPr algn="ctr"/>
+                <a:endParaRPr lang="en-US" sz="1600" dirty="0">
+                  <a:solidFill>
+                    <a:schemeClr val="tx1"/>
+                  </a:solidFill>
+                </a:endParaRPr>
+              </a:p>
+            </p:txBody>
+          </p:sp>
+        </mc:Choice>
+        <mc:Fallback>
+          <p:sp>
+            <p:nvSpPr>
+              <p:cNvPr id="8" name="Rectangle 7"/>
+              <p:cNvSpPr>
+                <a:spLocks noRot="1" noChangeAspect="1" noMove="1" noResize="1" noEditPoints="1" noAdjustHandles="1" noChangeArrowheads="1" noChangeShapeType="1" noTextEdit="1"/>
+              </p:cNvSpPr>
+              <p:nvPr/>
+            </p:nvSpPr>
+            <p:spPr>
+              <a:xfrm>
+                <a:off x="1323173" y="606750"/>
+                <a:ext cx="850607" cy="2700472"/>
+              </a:xfrm>
+              <a:prstGeom prst="rect">
+                <a:avLst/>
+              </a:prstGeom>
+              <a:blipFill rotWithShape="0">
+                <a:blip r:embed="rId3"/>
+                <a:stretch>
+                  <a:fillRect l="-4225"/>
+                </a:stretch>
+              </a:blipFill>
+            </p:spPr>
+            <p:txBody>
+              <a:bodyPr/>
+              <a:lstStyle/>
+              <a:p>
+                <a:r>
+                  <a:rPr lang="en-US">
+                    <a:noFill/>
+                  </a:rPr>
+                  <a:t> </a:t>
+                </a:r>
+              </a:p>
+            </p:txBody>
+          </p:sp>
+        </mc:Fallback>
+      </mc:AlternateContent>
+      <p:cxnSp>
+        <p:nvCxnSpPr>
+          <p:cNvPr id="10" name="Straight Arrow Connector 9"/>
+          <p:cNvCxnSpPr>
+            <a:stCxn id="8" idx="3"/>
+          </p:cNvCxnSpPr>
+          <p:nvPr/>
+        </p:nvCxnSpPr>
+        <p:spPr>
+          <a:xfrm>
+            <a:off x="2173780" y="1956986"/>
+            <a:ext cx="436070" cy="0"/>
+          </a:xfrm>
+          <a:prstGeom prst="straightConnector1">
+            <a:avLst/>
+          </a:prstGeom>
+          <a:ln>
+            <a:tailEnd type="triangle"/>
+          </a:ln>
+        </p:spPr>
+        <p:style>
+          <a:lnRef idx="1">
+            <a:schemeClr val="accent2"/>
+          </a:lnRef>
+          <a:fillRef idx="0">
+            <a:schemeClr val="accent2"/>
+          </a:fillRef>
+          <a:effectRef idx="0">
+            <a:schemeClr val="accent2"/>
+          </a:effectRef>
+          <a:fontRef idx="minor">
+            <a:schemeClr val="tx1"/>
+          </a:fontRef>
+        </p:style>
+      </p:cxnSp>
+      <p:sp>
+        <p:nvSpPr>
+          <p:cNvPr id="12" name="Rectangle 11"/>
+          <p:cNvSpPr/>
+          <p:nvPr/>
+        </p:nvSpPr>
+        <p:spPr>
+          <a:xfrm>
+            <a:off x="2150927" y="1618432"/>
+            <a:ext cx="514885" cy="338554"/>
+          </a:xfrm>
+          <a:prstGeom prst="rect">
+            <a:avLst/>
+          </a:prstGeom>
+          <a:noFill/>
+        </p:spPr>
+        <p:txBody>
+          <a:bodyPr wrap="none" lIns="91440" tIns="45720" rIns="91440" bIns="45720">
+            <a:spAutoFit/>
+          </a:bodyPr>
+          <a:lstStyle/>
+          <a:p>
+            <a:pPr algn="ctr"/>
+            <a:r>
+              <a:rPr lang="en-US" sz="1600" b="0" cap="none" spc="0" dirty="0" smtClean="0">
+                <a:ln w="0"/>
+                <a:solidFill>
+                  <a:schemeClr val="tx1"/>
+                </a:solidFill>
+                <a:effectLst>
+                  <a:outerShdw blurRad="38100" dist="19050" dir="2700000" algn="tl" rotWithShape="0">
+                    <a:schemeClr val="dk1">
+                      <a:alpha val="40000"/>
+                    </a:schemeClr>
+                  </a:outerShdw>
+                </a:effectLst>
+              </a:rPr>
+              <a:t>sort</a:t>
+            </a:r>
+            <a:endParaRPr lang="en-US" sz="1600" b="0" cap="none" spc="0" dirty="0">
+              <a:ln w="0"/>
+              <a:solidFill>
+                <a:schemeClr val="tx1"/>
+              </a:solidFill>
+              <a:effectLst>
+                <a:outerShdw blurRad="38100" dist="19050" dir="2700000" algn="tl" rotWithShape="0">
+                  <a:schemeClr val="dk1">
+                    <a:alpha val="40000"/>
+                  </a:schemeClr>
+                </a:outerShdw>
+              </a:effectLst>
+            </a:endParaRPr>
+          </a:p>
+        </p:txBody>
+      </p:sp>
+      <mc:AlternateContent xmlns:mc="http://schemas.openxmlformats.org/markup-compatibility/2006">
+        <mc:Choice xmlns:a14="http://schemas.microsoft.com/office/drawing/2010/main" Requires="a14">
+          <p:sp>
+            <p:nvSpPr>
+              <p:cNvPr id="15" name="Rectangle 14"/>
+              <p:cNvSpPr/>
+              <p:nvPr/>
+            </p:nvSpPr>
+            <p:spPr>
+              <a:xfrm>
+                <a:off x="3891549" y="606750"/>
+                <a:ext cx="664596" cy="2700472"/>
+              </a:xfrm>
+              <a:prstGeom prst="rect">
+                <a:avLst/>
+              </a:prstGeom>
+              <a:solidFill>
+                <a:schemeClr val="bg1"/>
+              </a:solidFill>
+            </p:spPr>
+            <p:style>
+              <a:lnRef idx="2">
+                <a:schemeClr val="accent1">
+                  <a:shade val="50000"/>
+                </a:schemeClr>
+              </a:lnRef>
+              <a:fillRef idx="1">
+                <a:schemeClr val="accent1"/>
+              </a:fillRef>
+              <a:effectRef idx="0">
+                <a:schemeClr val="accent1"/>
+              </a:effectRef>
+              <a:fontRef idx="minor">
+                <a:schemeClr val="lt1"/>
+              </a:fontRef>
+            </p:style>
+            <p:txBody>
+              <a:bodyPr rtlCol="0" anchor="ctr"/>
+              <a:lstStyle/>
+              <a:p>
+                <a:pPr algn="ctr"/>
+                <a14:m>
+                  <m:oMathPara xmlns:m="http://schemas.openxmlformats.org/officeDocument/2006/math">
+                    <m:oMathParaPr>
+                      <m:jc m:val="centerGroup"/>
+                    </m:oMathParaPr>
+                    <m:oMath xmlns:m="http://schemas.openxmlformats.org/officeDocument/2006/math">
+                      <m:r>
+                        <a:rPr lang="en-US" sz="1600" b="0" i="1" smtClean="0">
+                          <a:solidFill>
+                            <a:srgbClr val="FF0000"/>
+                          </a:solidFill>
+                          <a:latin typeface="Cambria Math" panose="02040503050406030204" pitchFamily="18" charset="0"/>
+                        </a:rPr>
+                        <m:t>00,4</m:t>
+                      </m:r>
+                    </m:oMath>
+                  </m:oMathPara>
+                </a14:m>
+                <a:endParaRPr lang="en-US" sz="1600" b="0" dirty="0" smtClean="0">
+                  <a:solidFill>
+                    <a:srgbClr val="FF0000"/>
+                  </a:solidFill>
+                  <a:latin typeface="Cambria Math" panose="02040503050406030204" pitchFamily="18" charset="0"/>
+                </a:endParaRPr>
+              </a:p>
+              <a:p>
+                <a:pPr algn="ctr"/>
+                <a14:m>
+                  <m:oMathPara xmlns:m="http://schemas.openxmlformats.org/officeDocument/2006/math">
+                    <m:oMathParaPr>
+                      <m:jc m:val="centerGroup"/>
+                    </m:oMathParaPr>
+                    <m:oMath xmlns:m="http://schemas.openxmlformats.org/officeDocument/2006/math">
+                      <m:r>
+                        <a:rPr lang="en-US" sz="1600" b="0" i="1" smtClean="0">
+                          <a:solidFill>
+                            <a:schemeClr val="tx1"/>
+                          </a:solidFill>
+                          <a:latin typeface="Cambria Math" panose="02040503050406030204" pitchFamily="18" charset="0"/>
+                        </a:rPr>
+                        <m:t>0001</m:t>
+                      </m:r>
+                    </m:oMath>
+                  </m:oMathPara>
+                </a14:m>
+                <a:endParaRPr lang="en-US" sz="1600" b="0" dirty="0" smtClean="0">
+                  <a:solidFill>
+                    <a:schemeClr val="tx1"/>
+                  </a:solidFill>
+                  <a:latin typeface="Cambria Math" panose="02040503050406030204" pitchFamily="18" charset="0"/>
+                </a:endParaRPr>
+              </a:p>
+              <a:p>
+                <a:pPr algn="ctr"/>
+                <a14:m>
+                  <m:oMathPara xmlns:m="http://schemas.openxmlformats.org/officeDocument/2006/math">
+                    <m:oMathParaPr>
+                      <m:jc m:val="centerGroup"/>
+                    </m:oMathParaPr>
+                    <m:oMath xmlns:m="http://schemas.openxmlformats.org/officeDocument/2006/math">
+                      <m:r>
+                        <a:rPr lang="en-US" sz="1600" b="0" i="1" smtClean="0">
+                          <a:solidFill>
+                            <a:schemeClr val="tx1"/>
+                          </a:solidFill>
+                          <a:latin typeface="Cambria Math" panose="02040503050406030204" pitchFamily="18" charset="0"/>
+                        </a:rPr>
+                        <m:t>0011</m:t>
+                      </m:r>
+                    </m:oMath>
+                  </m:oMathPara>
+                </a14:m>
+                <a:endParaRPr lang="en-US" sz="1600" b="0" dirty="0" smtClean="0">
+                  <a:solidFill>
+                    <a:schemeClr val="tx1"/>
+                  </a:solidFill>
+                  <a:latin typeface="Cambria Math" panose="02040503050406030204" pitchFamily="18" charset="0"/>
+                </a:endParaRPr>
+              </a:p>
+              <a:p>
+                <a:pPr algn="ctr"/>
+                <a14:m>
+                  <m:oMathPara xmlns:m="http://schemas.openxmlformats.org/officeDocument/2006/math">
+                    <m:oMathParaPr>
+                      <m:jc m:val="centerGroup"/>
+                    </m:oMathParaPr>
+                    <m:oMath xmlns:m="http://schemas.openxmlformats.org/officeDocument/2006/math">
+                      <m:r>
+                        <a:rPr lang="en-US" sz="1600" b="0" i="1" smtClean="0">
+                          <a:solidFill>
+                            <a:schemeClr val="tx1"/>
+                          </a:solidFill>
+                          <a:latin typeface="Cambria Math" panose="02040503050406030204" pitchFamily="18" charset="0"/>
+                        </a:rPr>
+                        <m:t>0110</m:t>
+                      </m:r>
+                    </m:oMath>
+                  </m:oMathPara>
+                </a14:m>
+                <a:endParaRPr lang="en-US" sz="1600" b="0" dirty="0" smtClean="0">
+                  <a:solidFill>
+                    <a:schemeClr val="tx1"/>
+                  </a:solidFill>
+                  <a:latin typeface="Cambria Math" panose="02040503050406030204" pitchFamily="18" charset="0"/>
+                </a:endParaRPr>
+              </a:p>
+              <a:p>
+                <a:pPr algn="ctr"/>
+                <a14:m>
+                  <m:oMathPara xmlns:m="http://schemas.openxmlformats.org/officeDocument/2006/math">
+                    <m:oMathParaPr>
+                      <m:jc m:val="centerGroup"/>
+                    </m:oMathParaPr>
+                    <m:oMath xmlns:m="http://schemas.openxmlformats.org/officeDocument/2006/math">
+                      <m:r>
+                        <a:rPr lang="en-US" sz="1600" b="0" i="1" smtClean="0">
+                          <a:solidFill>
+                            <a:schemeClr val="tx1"/>
+                          </a:solidFill>
+                          <a:latin typeface="Cambria Math" panose="02040503050406030204" pitchFamily="18" charset="0"/>
+                        </a:rPr>
+                        <m:t>0111</m:t>
+                      </m:r>
+                    </m:oMath>
+                  </m:oMathPara>
+                </a14:m>
+                <a:endParaRPr lang="en-US" sz="1600" b="0" dirty="0" smtClean="0">
+                  <a:solidFill>
+                    <a:schemeClr val="tx1"/>
+                  </a:solidFill>
+                  <a:latin typeface="Cambria Math" panose="02040503050406030204" pitchFamily="18" charset="0"/>
+                </a:endParaRPr>
+              </a:p>
+              <a:p>
+                <a:pPr algn="ctr"/>
+                <a14:m>
+                  <m:oMathPara xmlns:m="http://schemas.openxmlformats.org/officeDocument/2006/math">
+                    <m:oMathParaPr>
+                      <m:jc m:val="centerGroup"/>
+                    </m:oMathParaPr>
+                    <m:oMath xmlns:m="http://schemas.openxmlformats.org/officeDocument/2006/math">
+                      <m:r>
+                        <a:rPr lang="en-US" sz="1600" b="0" i="1" smtClean="0">
+                          <a:solidFill>
+                            <a:srgbClr val="FF0000"/>
+                          </a:solidFill>
+                          <a:latin typeface="Cambria Math" panose="02040503050406030204" pitchFamily="18" charset="0"/>
+                        </a:rPr>
+                        <m:t>01,1</m:t>
+                      </m:r>
+                    </m:oMath>
+                  </m:oMathPara>
+                </a14:m>
+                <a:endParaRPr lang="en-US" sz="1600" b="0" dirty="0" smtClean="0">
+                  <a:solidFill>
+                    <a:srgbClr val="FF0000"/>
+                  </a:solidFill>
+                  <a:latin typeface="Cambria Math" panose="02040503050406030204" pitchFamily="18" charset="0"/>
+                </a:endParaRPr>
+              </a:p>
+              <a:p>
+                <a:pPr algn="ctr"/>
+                <a14:m>
+                  <m:oMathPara xmlns:m="http://schemas.openxmlformats.org/officeDocument/2006/math">
+                    <m:oMathParaPr>
+                      <m:jc m:val="centerGroup"/>
+                    </m:oMathParaPr>
+                    <m:oMath xmlns:m="http://schemas.openxmlformats.org/officeDocument/2006/math">
+                      <m:r>
+                        <a:rPr lang="en-US" sz="1600" b="0" i="1" smtClean="0">
+                          <a:solidFill>
+                            <a:schemeClr val="tx1"/>
+                          </a:solidFill>
+                          <a:latin typeface="Cambria Math" panose="02040503050406030204" pitchFamily="18" charset="0"/>
+                        </a:rPr>
+                        <m:t>1000</m:t>
+                      </m:r>
+                    </m:oMath>
+                  </m:oMathPara>
+                </a14:m>
+                <a:endParaRPr lang="en-US" sz="1600" b="0" dirty="0" smtClean="0">
+                  <a:solidFill>
+                    <a:schemeClr val="tx1"/>
+                  </a:solidFill>
+                  <a:latin typeface="Cambria Math" panose="02040503050406030204" pitchFamily="18" charset="0"/>
+                </a:endParaRPr>
+              </a:p>
+              <a:p>
+                <a:pPr algn="ctr"/>
+                <a14:m>
+                  <m:oMathPara xmlns:m="http://schemas.openxmlformats.org/officeDocument/2006/math">
+                    <m:oMathParaPr>
+                      <m:jc m:val="centerGroup"/>
+                    </m:oMathParaPr>
+                    <m:oMath xmlns:m="http://schemas.openxmlformats.org/officeDocument/2006/math">
+                      <m:r>
+                        <a:rPr lang="en-US" sz="1600" b="0" i="1" smtClean="0">
+                          <a:solidFill>
+                            <a:srgbClr val="FF0000"/>
+                          </a:solidFill>
+                          <a:latin typeface="Cambria Math" panose="02040503050406030204" pitchFamily="18" charset="0"/>
+                        </a:rPr>
+                        <m:t>11,2</m:t>
+                      </m:r>
+                    </m:oMath>
+                  </m:oMathPara>
+                </a14:m>
+                <a:endParaRPr lang="en-US" sz="1600" b="0" dirty="0" smtClean="0">
+                  <a:solidFill>
+                    <a:srgbClr val="FF0000"/>
+                  </a:solidFill>
+                  <a:latin typeface="Cambria Math" panose="02040503050406030204" pitchFamily="18" charset="0"/>
+                </a:endParaRPr>
+              </a:p>
+              <a:p>
+                <a:pPr algn="ctr"/>
+                <a14:m>
+                  <m:oMathPara xmlns:m="http://schemas.openxmlformats.org/officeDocument/2006/math">
+                    <m:oMathParaPr>
+                      <m:jc m:val="centerGroup"/>
+                    </m:oMathParaPr>
+                    <m:oMath xmlns:m="http://schemas.openxmlformats.org/officeDocument/2006/math">
+                      <m:r>
+                        <a:rPr lang="en-US" sz="1600" b="0" i="1" smtClean="0">
+                          <a:solidFill>
+                            <a:schemeClr val="tx1"/>
+                          </a:solidFill>
+                          <a:latin typeface="Cambria Math" panose="02040503050406030204" pitchFamily="18" charset="0"/>
+                        </a:rPr>
+                        <m:t>0010</m:t>
+                      </m:r>
+                    </m:oMath>
+                  </m:oMathPara>
+                </a14:m>
+                <a:endParaRPr lang="en-US" sz="1600" b="0" dirty="0" smtClean="0">
+                  <a:solidFill>
+                    <a:schemeClr val="tx1"/>
+                  </a:solidFill>
+                  <a:latin typeface="Cambria Math" panose="02040503050406030204" pitchFamily="18" charset="0"/>
+                </a:endParaRPr>
+              </a:p>
+              <a:p>
+                <a:pPr algn="ctr"/>
+                <a:r>
+                  <a:rPr lang="en-US" sz="1600" b="0" dirty="0" smtClean="0">
+                    <a:solidFill>
+                      <a:schemeClr val="tx1"/>
+                    </a:solidFill>
+                    <a:latin typeface="Cambria Math" panose="02040503050406030204" pitchFamily="18" charset="0"/>
+                  </a:rPr>
+                  <a:t>0111</a:t>
+                </a:r>
+              </a:p>
+            </p:txBody>
+          </p:sp>
+        </mc:Choice>
+        <mc:Fallback>
+          <p:sp>
+            <p:nvSpPr>
+              <p:cNvPr id="15" name="Rectangle 14"/>
+              <p:cNvSpPr>
+                <a:spLocks noRot="1" noChangeAspect="1" noMove="1" noResize="1" noEditPoints="1" noAdjustHandles="1" noChangeArrowheads="1" noChangeShapeType="1" noTextEdit="1"/>
+              </p:cNvSpPr>
+              <p:nvPr/>
+            </p:nvSpPr>
+            <p:spPr>
+              <a:xfrm>
+                <a:off x="3891549" y="606750"/>
+                <a:ext cx="664596" cy="2700472"/>
+              </a:xfrm>
+              <a:prstGeom prst="rect">
+                <a:avLst/>
+              </a:prstGeom>
+              <a:blipFill rotWithShape="0">
+                <a:blip r:embed="rId4"/>
+                <a:stretch>
+                  <a:fillRect l="-4505"/>
+                </a:stretch>
+              </a:blipFill>
+            </p:spPr>
+            <p:txBody>
+              <a:bodyPr/>
+              <a:lstStyle/>
+              <a:p>
+                <a:r>
+                  <a:rPr lang="en-US">
+                    <a:noFill/>
+                  </a:rPr>
+                  <a:t> </a:t>
+                </a:r>
+              </a:p>
+            </p:txBody>
+          </p:sp>
+        </mc:Fallback>
+      </mc:AlternateContent>
+      <mc:AlternateContent xmlns:mc="http://schemas.openxmlformats.org/markup-compatibility/2006">
+        <mc:Choice xmlns:a14="http://schemas.microsoft.com/office/drawing/2010/main" Requires="a14">
+          <p:sp>
+            <p:nvSpPr>
+              <p:cNvPr id="21" name="Rectangle 20"/>
+              <p:cNvSpPr/>
+              <p:nvPr/>
+            </p:nvSpPr>
+            <p:spPr>
+              <a:xfrm>
+                <a:off x="4984064" y="606750"/>
+                <a:ext cx="836893" cy="2700472"/>
+              </a:xfrm>
+              <a:prstGeom prst="rect">
+                <a:avLst/>
+              </a:prstGeom>
+              <a:solidFill>
+                <a:schemeClr val="bg1"/>
+              </a:solidFill>
+            </p:spPr>
+            <p:style>
+              <a:lnRef idx="2">
+                <a:schemeClr val="accent1">
+                  <a:shade val="50000"/>
+                </a:schemeClr>
+              </a:lnRef>
+              <a:fillRef idx="1">
+                <a:schemeClr val="accent1"/>
+              </a:fillRef>
+              <a:effectRef idx="0">
+                <a:schemeClr val="accent1"/>
+              </a:effectRef>
+              <a:fontRef idx="minor">
+                <a:schemeClr val="lt1"/>
+              </a:fontRef>
+            </p:style>
+            <p:txBody>
+              <a:bodyPr rtlCol="0" anchor="ctr"/>
+              <a:lstStyle/>
+              <a:p>
+                <a:pPr algn="ctr"/>
+                <a14:m>
+                  <m:oMathPara xmlns:m="http://schemas.openxmlformats.org/officeDocument/2006/math">
+                    <m:oMathParaPr>
+                      <m:jc m:val="centerGroup"/>
+                    </m:oMathParaPr>
+                    <m:oMath xmlns:m="http://schemas.openxmlformats.org/officeDocument/2006/math">
+                      <m:r>
+                        <a:rPr lang="en-US" sz="1600" b="0" i="1" smtClean="0">
+                          <a:solidFill>
+                            <a:schemeClr val="tx1"/>
+                          </a:solidFill>
+                          <a:latin typeface="Cambria Math" panose="02040503050406030204" pitchFamily="18" charset="0"/>
+                        </a:rPr>
+                        <m:t>000001</m:t>
+                      </m:r>
+                    </m:oMath>
+                  </m:oMathPara>
+                </a14:m>
+                <a:endParaRPr lang="en-US" sz="1600" b="0" dirty="0" smtClean="0">
+                  <a:solidFill>
+                    <a:schemeClr val="tx1"/>
+                  </a:solidFill>
+                </a:endParaRPr>
+              </a:p>
+              <a:p>
+                <a:pPr algn="ctr"/>
+                <a14:m>
+                  <m:oMathPara xmlns:m="http://schemas.openxmlformats.org/officeDocument/2006/math">
+                    <m:oMathParaPr>
+                      <m:jc m:val="centerGroup"/>
+                    </m:oMathParaPr>
+                    <m:oMath xmlns:m="http://schemas.openxmlformats.org/officeDocument/2006/math">
+                      <m:r>
+                        <a:rPr lang="en-US" sz="1600" b="0" i="1" smtClean="0">
+                          <a:solidFill>
+                            <a:schemeClr val="tx1"/>
+                          </a:solidFill>
+                          <a:latin typeface="Cambria Math" panose="02040503050406030204" pitchFamily="18" charset="0"/>
+                        </a:rPr>
+                        <m:t>000011</m:t>
+                      </m:r>
+                    </m:oMath>
+                  </m:oMathPara>
+                </a14:m>
+                <a:endParaRPr lang="en-US" sz="1600" b="0" dirty="0" smtClean="0">
+                  <a:solidFill>
+                    <a:schemeClr val="tx1"/>
+                  </a:solidFill>
+                </a:endParaRPr>
+              </a:p>
+              <a:p>
+                <a:pPr algn="ctr"/>
+                <a14:m>
+                  <m:oMathPara xmlns:m="http://schemas.openxmlformats.org/officeDocument/2006/math">
+                    <m:oMathParaPr>
+                      <m:jc m:val="centerGroup"/>
+                    </m:oMathParaPr>
+                    <m:oMath xmlns:m="http://schemas.openxmlformats.org/officeDocument/2006/math">
+                      <m:r>
+                        <a:rPr lang="en-US" sz="1600" b="0" i="1" smtClean="0">
+                          <a:solidFill>
+                            <a:schemeClr val="tx1"/>
+                          </a:solidFill>
+                          <a:latin typeface="Cambria Math" panose="02040503050406030204" pitchFamily="18" charset="0"/>
+                        </a:rPr>
+                        <m:t>000110</m:t>
+                      </m:r>
+                    </m:oMath>
+                  </m:oMathPara>
+                </a14:m>
+                <a:endParaRPr lang="en-US" sz="1600" b="0" dirty="0" smtClean="0">
+                  <a:solidFill>
+                    <a:schemeClr val="tx1"/>
+                  </a:solidFill>
+                </a:endParaRPr>
+              </a:p>
+              <a:p>
+                <a:pPr algn="ctr"/>
+                <a14:m>
+                  <m:oMathPara xmlns:m="http://schemas.openxmlformats.org/officeDocument/2006/math">
+                    <m:oMathParaPr>
+                      <m:jc m:val="centerGroup"/>
+                    </m:oMathParaPr>
+                    <m:oMath xmlns:m="http://schemas.openxmlformats.org/officeDocument/2006/math">
+                      <m:r>
+                        <a:rPr lang="en-US" sz="1600" b="0" i="1" smtClean="0">
+                          <a:solidFill>
+                            <a:schemeClr val="tx1"/>
+                          </a:solidFill>
+                          <a:latin typeface="Cambria Math" panose="02040503050406030204" pitchFamily="18" charset="0"/>
+                        </a:rPr>
+                        <m:t>000111</m:t>
+                      </m:r>
+                    </m:oMath>
+                  </m:oMathPara>
+                </a14:m>
+                <a:endParaRPr lang="en-US" sz="1600" b="0" dirty="0" smtClean="0">
+                  <a:solidFill>
+                    <a:schemeClr val="tx1"/>
+                  </a:solidFill>
+                </a:endParaRPr>
+              </a:p>
+              <a:p>
+                <a:pPr algn="ctr"/>
+                <a14:m>
+                  <m:oMathPara xmlns:m="http://schemas.openxmlformats.org/officeDocument/2006/math">
+                    <m:oMathParaPr>
+                      <m:jc m:val="centerGroup"/>
+                    </m:oMathParaPr>
+                    <m:oMath xmlns:m="http://schemas.openxmlformats.org/officeDocument/2006/math">
+                      <m:r>
+                        <a:rPr lang="en-US" sz="1600" b="0" i="1" smtClean="0">
+                          <a:solidFill>
+                            <a:schemeClr val="tx1"/>
+                          </a:solidFill>
+                          <a:latin typeface="Cambria Math" panose="02040503050406030204" pitchFamily="18" charset="0"/>
+                        </a:rPr>
+                        <m:t>011000</m:t>
+                      </m:r>
+                    </m:oMath>
+                  </m:oMathPara>
+                </a14:m>
+                <a:endParaRPr lang="en-US" sz="1600" b="0" dirty="0" smtClean="0">
+                  <a:solidFill>
+                    <a:schemeClr val="tx1"/>
+                  </a:solidFill>
+                </a:endParaRPr>
+              </a:p>
+              <a:p>
+                <a:pPr algn="ctr"/>
+                <a:r>
+                  <a:rPr lang="en-US" sz="1600" dirty="0" smtClean="0">
+                    <a:solidFill>
+                      <a:schemeClr val="tx1"/>
+                    </a:solidFill>
+                  </a:rPr>
+                  <a:t>100010</a:t>
+                </a:r>
+              </a:p>
+              <a:p>
+                <a:pPr algn="ctr"/>
+                <a:r>
+                  <a:rPr lang="en-US" sz="1600" dirty="0" smtClean="0">
+                    <a:solidFill>
+                      <a:schemeClr val="tx1"/>
+                    </a:solidFill>
+                  </a:rPr>
+                  <a:t>100111</a:t>
+                </a:r>
+                <a:endParaRPr lang="en-US" sz="1600" dirty="0">
+                  <a:solidFill>
+                    <a:schemeClr val="tx1"/>
+                  </a:solidFill>
+                </a:endParaRPr>
+              </a:p>
+            </p:txBody>
+          </p:sp>
+        </mc:Choice>
+        <mc:Fallback>
+          <p:sp>
+            <p:nvSpPr>
+              <p:cNvPr id="21" name="Rectangle 20"/>
+              <p:cNvSpPr>
+                <a:spLocks noRot="1" noChangeAspect="1" noMove="1" noResize="1" noEditPoints="1" noAdjustHandles="1" noChangeArrowheads="1" noChangeShapeType="1" noTextEdit="1"/>
+              </p:cNvSpPr>
+              <p:nvPr/>
+            </p:nvSpPr>
+            <p:spPr>
+              <a:xfrm>
+                <a:off x="4984064" y="606750"/>
+                <a:ext cx="836893" cy="2700472"/>
+              </a:xfrm>
+              <a:prstGeom prst="rect">
+                <a:avLst/>
+              </a:prstGeom>
+              <a:blipFill rotWithShape="0">
+                <a:blip r:embed="rId5"/>
+                <a:stretch>
+                  <a:fillRect l="-6475"/>
+                </a:stretch>
+              </a:blipFill>
+            </p:spPr>
+            <p:txBody>
+              <a:bodyPr/>
+              <a:lstStyle/>
+              <a:p>
+                <a:r>
+                  <a:rPr lang="en-US">
+                    <a:noFill/>
+                  </a:rPr>
+                  <a:t> </a:t>
+                </a:r>
+              </a:p>
+            </p:txBody>
+          </p:sp>
+        </mc:Fallback>
+      </mc:AlternateContent>
+      <p:sp>
+        <p:nvSpPr>
+          <p:cNvPr id="23" name="Rectangle 22"/>
+          <p:cNvSpPr/>
+          <p:nvPr/>
+        </p:nvSpPr>
+        <p:spPr>
+          <a:xfrm>
+            <a:off x="4572165" y="1618432"/>
+            <a:ext cx="395878" cy="338554"/>
+          </a:xfrm>
+          <a:prstGeom prst="rect">
+            <a:avLst/>
+          </a:prstGeom>
+          <a:noFill/>
+        </p:spPr>
+        <p:txBody>
+          <a:bodyPr wrap="none" lIns="91440" tIns="45720" rIns="91440" bIns="45720">
+            <a:spAutoFit/>
+          </a:bodyPr>
+          <a:lstStyle/>
+          <a:p>
+            <a:pPr algn="ctr"/>
+            <a:r>
+              <a:rPr lang="en-US" sz="1600" b="0" cap="none" spc="0" dirty="0" smtClean="0">
+                <a:ln w="0"/>
+                <a:solidFill>
+                  <a:schemeClr val="tx1"/>
+                </a:solidFill>
+                <a:effectLst>
+                  <a:outerShdw blurRad="38100" dist="19050" dir="2700000" algn="tl" rotWithShape="0">
+                    <a:schemeClr val="dk1">
+                      <a:alpha val="40000"/>
+                    </a:schemeClr>
+                  </a:outerShdw>
+                </a:effectLst>
+              </a:rPr>
+              <a:t>Re</a:t>
+            </a:r>
+            <a:endParaRPr lang="en-US" sz="1600" b="0" cap="none" spc="0" dirty="0">
+              <a:ln w="0"/>
+              <a:solidFill>
+                <a:schemeClr val="tx1"/>
+              </a:solidFill>
+              <a:effectLst>
+                <a:outerShdw blurRad="38100" dist="19050" dir="2700000" algn="tl" rotWithShape="0">
+                  <a:schemeClr val="dk1">
+                    <a:alpha val="40000"/>
+                  </a:schemeClr>
+                </a:outerShdw>
+              </a:effectLst>
+            </a:endParaRPr>
+          </a:p>
+        </p:txBody>
+      </p:sp>
+      <p:sp>
+        <p:nvSpPr>
+          <p:cNvPr id="20" name="Oval Callout 19"/>
+          <p:cNvSpPr/>
+          <p:nvPr/>
+        </p:nvSpPr>
+        <p:spPr>
+          <a:xfrm>
+            <a:off x="4572165" y="326394"/>
+            <a:ext cx="1043663" cy="612648"/>
+          </a:xfrm>
+          <a:prstGeom prst="wedgeEllipseCallout">
+            <a:avLst>
+              <a:gd name="adj1" fmla="val -49374"/>
+              <a:gd name="adj2" fmla="val 73659"/>
+            </a:avLst>
+          </a:prstGeom>
+          <a:solidFill>
+            <a:schemeClr val="bg1"/>
+          </a:solidFill>
+        </p:spPr>
+        <p:style>
+          <a:lnRef idx="2">
+            <a:schemeClr val="accent1">
+              <a:shade val="50000"/>
+            </a:schemeClr>
+          </a:lnRef>
+          <a:fillRef idx="1">
+            <a:schemeClr val="accent1"/>
+          </a:fillRef>
+          <a:effectRef idx="0">
+            <a:schemeClr val="accent1"/>
+          </a:effectRef>
+          <a:fontRef idx="minor">
+            <a:schemeClr val="lt1"/>
+          </a:fontRef>
+        </p:style>
+        <p:txBody>
+          <a:bodyPr rtlCol="0" anchor="ctr"/>
+          <a:lstStyle/>
+          <a:p>
+            <a:pPr algn="ctr"/>
+            <a:r>
+              <a:rPr lang="en-US" sz="1600" dirty="0" smtClean="0">
+                <a:solidFill>
+                  <a:schemeClr val="tx1"/>
+                </a:solidFill>
+              </a:rPr>
+              <a:t>Index Table</a:t>
+            </a:r>
+            <a:endParaRPr lang="en-US" sz="1600" dirty="0">
+              <a:solidFill>
+                <a:schemeClr val="tx1"/>
+              </a:solidFill>
+            </a:endParaRPr>
+          </a:p>
+        </p:txBody>
+      </p:sp>
+      <p:sp>
+        <p:nvSpPr>
+          <p:cNvPr id="24" name="Rectangle 23"/>
+          <p:cNvSpPr/>
+          <p:nvPr/>
+        </p:nvSpPr>
+        <p:spPr>
+          <a:xfrm>
+            <a:off x="4507852" y="1974075"/>
+            <a:ext cx="524503" cy="338554"/>
+          </a:xfrm>
+          <a:prstGeom prst="rect">
+            <a:avLst/>
+          </a:prstGeom>
+          <a:noFill/>
+        </p:spPr>
+        <p:txBody>
+          <a:bodyPr wrap="none" lIns="91440" tIns="45720" rIns="91440" bIns="45720">
+            <a:spAutoFit/>
+          </a:bodyPr>
+          <a:lstStyle/>
+          <a:p>
+            <a:pPr algn="ctr"/>
+            <a:r>
+              <a:rPr lang="en-US" sz="1600" b="0" cap="none" spc="0" dirty="0" smtClean="0">
+                <a:ln w="0"/>
+                <a:solidFill>
+                  <a:schemeClr val="tx1"/>
+                </a:solidFill>
+                <a:effectLst>
+                  <a:outerShdw blurRad="38100" dist="19050" dir="2700000" algn="tl" rotWithShape="0">
+                    <a:schemeClr val="dk1">
+                      <a:alpha val="40000"/>
+                    </a:schemeClr>
+                  </a:outerShdw>
+                </a:effectLst>
+              </a:rPr>
+              <a:t>Gen</a:t>
+            </a:r>
+            <a:endParaRPr lang="en-US" sz="1600" b="0" cap="none" spc="0" dirty="0">
+              <a:ln w="0"/>
+              <a:solidFill>
+                <a:schemeClr val="tx1"/>
+              </a:solidFill>
+              <a:effectLst>
+                <a:outerShdw blurRad="38100" dist="19050" dir="2700000" algn="tl" rotWithShape="0">
+                  <a:schemeClr val="dk1">
+                    <a:alpha val="40000"/>
+                  </a:schemeClr>
+                </a:outerShdw>
+              </a:effectLst>
+            </a:endParaRPr>
+          </a:p>
+        </p:txBody>
+      </p:sp>
+      <p:sp>
+        <p:nvSpPr>
+          <p:cNvPr id="25" name="Oval Callout 24"/>
+          <p:cNvSpPr/>
+          <p:nvPr/>
+        </p:nvSpPr>
+        <p:spPr>
+          <a:xfrm>
+            <a:off x="2173780" y="207555"/>
+            <a:ext cx="1133573" cy="612648"/>
+          </a:xfrm>
+          <a:prstGeom prst="wedgeEllipseCallout">
+            <a:avLst>
+              <a:gd name="adj1" fmla="val -49374"/>
+              <a:gd name="adj2" fmla="val 73659"/>
+            </a:avLst>
+          </a:prstGeom>
+          <a:solidFill>
+            <a:schemeClr val="bg1"/>
+          </a:solidFill>
+        </p:spPr>
+        <p:style>
+          <a:lnRef idx="2">
+            <a:schemeClr val="accent1">
+              <a:shade val="50000"/>
+            </a:schemeClr>
+          </a:lnRef>
+          <a:fillRef idx="1">
+            <a:schemeClr val="accent1"/>
+          </a:fillRef>
+          <a:effectRef idx="0">
+            <a:schemeClr val="accent1"/>
+          </a:effectRef>
+          <a:fontRef idx="minor">
+            <a:schemeClr val="lt1"/>
+          </a:fontRef>
+        </p:style>
+        <p:txBody>
+          <a:bodyPr rtlCol="0" anchor="ctr"/>
+          <a:lstStyle/>
+          <a:p>
+            <a:pPr algn="ctr"/>
+            <a:r>
+              <a:rPr lang="en-US" sz="1600" dirty="0" smtClean="0">
+                <a:solidFill>
+                  <a:schemeClr val="tx1"/>
+                </a:solidFill>
+              </a:rPr>
+              <a:t>End Points</a:t>
+            </a:r>
+            <a:endParaRPr lang="en-US" sz="1600" dirty="0">
+              <a:solidFill>
+                <a:schemeClr val="tx1"/>
+              </a:solidFill>
+            </a:endParaRPr>
+          </a:p>
+        </p:txBody>
+      </p:sp>
+      <p:sp>
+        <p:nvSpPr>
+          <p:cNvPr id="26" name="Oval Callout 25"/>
+          <p:cNvSpPr/>
+          <p:nvPr/>
+        </p:nvSpPr>
+        <p:spPr>
+          <a:xfrm>
+            <a:off x="4395410" y="3000564"/>
+            <a:ext cx="1145266" cy="512745"/>
+          </a:xfrm>
+          <a:prstGeom prst="wedgeEllipseCallout">
+            <a:avLst>
+              <a:gd name="adj1" fmla="val 30872"/>
+              <a:gd name="adj2" fmla="val -83964"/>
+            </a:avLst>
+          </a:prstGeom>
+          <a:solidFill>
+            <a:schemeClr val="bg1"/>
+          </a:solidFill>
+        </p:spPr>
+        <p:style>
+          <a:lnRef idx="2">
+            <a:schemeClr val="accent1">
+              <a:shade val="50000"/>
+            </a:schemeClr>
+          </a:lnRef>
+          <a:fillRef idx="1">
+            <a:schemeClr val="accent1"/>
+          </a:fillRef>
+          <a:effectRef idx="0">
+            <a:schemeClr val="accent1"/>
+          </a:effectRef>
+          <a:fontRef idx="minor">
+            <a:schemeClr val="lt1"/>
+          </a:fontRef>
+        </p:style>
+        <p:txBody>
+          <a:bodyPr rtlCol="0" anchor="ctr"/>
+          <a:lstStyle/>
+          <a:p>
+            <a:pPr algn="ctr"/>
+            <a:r>
+              <a:rPr lang="en-US" sz="1600" dirty="0" smtClean="0">
+                <a:solidFill>
+                  <a:schemeClr val="tx1"/>
+                </a:solidFill>
+              </a:rPr>
+              <a:t>Online</a:t>
+            </a:r>
+            <a:endParaRPr lang="en-US" sz="1600" dirty="0">
+              <a:solidFill>
+                <a:schemeClr val="tx1"/>
+              </a:solidFill>
+            </a:endParaRPr>
+          </a:p>
+        </p:txBody>
+      </p:sp>
+      <p:cxnSp>
+        <p:nvCxnSpPr>
+          <p:cNvPr id="39" name="Straight Arrow Connector 38"/>
+          <p:cNvCxnSpPr/>
+          <p:nvPr/>
+        </p:nvCxnSpPr>
+        <p:spPr>
+          <a:xfrm>
+            <a:off x="3456480" y="1969891"/>
+            <a:ext cx="436070" cy="0"/>
+          </a:xfrm>
+          <a:prstGeom prst="straightConnector1">
+            <a:avLst/>
+          </a:prstGeom>
+          <a:ln>
+            <a:tailEnd type="triangle"/>
+          </a:ln>
+        </p:spPr>
+        <p:style>
+          <a:lnRef idx="1">
+            <a:schemeClr val="accent2"/>
+          </a:lnRef>
+          <a:fillRef idx="0">
+            <a:schemeClr val="accent2"/>
+          </a:fillRef>
+          <a:effectRef idx="0">
+            <a:schemeClr val="accent2"/>
+          </a:effectRef>
+          <a:fontRef idx="minor">
+            <a:schemeClr val="tx1"/>
+          </a:fontRef>
+        </p:style>
+      </p:cxnSp>
+      <p:sp>
+        <p:nvSpPr>
+          <p:cNvPr id="40" name="Rectangle 39"/>
+          <p:cNvSpPr/>
+          <p:nvPr/>
+        </p:nvSpPr>
+        <p:spPr>
+          <a:xfrm>
+            <a:off x="3406891" y="1626976"/>
+            <a:ext cx="524503" cy="338554"/>
+          </a:xfrm>
+          <a:prstGeom prst="rect">
+            <a:avLst/>
+          </a:prstGeom>
+          <a:noFill/>
+        </p:spPr>
+        <p:txBody>
+          <a:bodyPr wrap="none" lIns="91440" tIns="45720" rIns="91440" bIns="45720">
+            <a:spAutoFit/>
+          </a:bodyPr>
+          <a:lstStyle/>
+          <a:p>
+            <a:pPr algn="ctr"/>
+            <a:r>
+              <a:rPr lang="en-US" sz="1600" b="0" cap="none" spc="0" dirty="0" smtClean="0">
+                <a:ln w="0"/>
+                <a:solidFill>
+                  <a:schemeClr val="tx1"/>
+                </a:solidFill>
+                <a:effectLst>
+                  <a:outerShdw blurRad="38100" dist="19050" dir="2700000" algn="tl" rotWithShape="0">
+                    <a:schemeClr val="dk1">
+                      <a:alpha val="40000"/>
+                    </a:schemeClr>
+                  </a:outerShdw>
+                </a:effectLst>
+              </a:rPr>
+              <a:t>Gen</a:t>
+            </a:r>
+            <a:endParaRPr lang="en-US" sz="1600" b="0" cap="none" spc="0" dirty="0">
+              <a:ln w="0"/>
+              <a:solidFill>
+                <a:schemeClr val="tx1"/>
+              </a:solidFill>
+              <a:effectLst>
+                <a:outerShdw blurRad="38100" dist="19050" dir="2700000" algn="tl" rotWithShape="0">
+                  <a:schemeClr val="dk1">
+                    <a:alpha val="40000"/>
+                  </a:schemeClr>
+                </a:outerShdw>
+              </a:effectLst>
+            </a:endParaRPr>
+          </a:p>
+        </p:txBody>
+      </p:sp>
+      <p:cxnSp>
+        <p:nvCxnSpPr>
+          <p:cNvPr id="41" name="Straight Arrow Connector 40"/>
+          <p:cNvCxnSpPr/>
+          <p:nvPr/>
+        </p:nvCxnSpPr>
+        <p:spPr>
+          <a:xfrm>
+            <a:off x="4556145" y="1965530"/>
+            <a:ext cx="436070" cy="0"/>
+          </a:xfrm>
+          <a:prstGeom prst="straightConnector1">
+            <a:avLst/>
+          </a:prstGeom>
+          <a:ln>
+            <a:tailEnd type="triangle"/>
+          </a:ln>
+        </p:spPr>
+        <p:style>
+          <a:lnRef idx="1">
+            <a:schemeClr val="accent2"/>
+          </a:lnRef>
+          <a:fillRef idx="0">
+            <a:schemeClr val="accent2"/>
+          </a:fillRef>
+          <a:effectRef idx="0">
+            <a:schemeClr val="accent2"/>
+          </a:effectRef>
+          <a:fontRef idx="minor">
+            <a:schemeClr val="tx1"/>
+          </a:fontRef>
+        </p:style>
+      </p:cxnSp>
+    </p:spTree>
+    <p:extLst>
+      <p:ext uri="{BB962C8B-B14F-4D97-AF65-F5344CB8AC3E}">
+        <p14:creationId xmlns:p14="http://schemas.microsoft.com/office/powerpoint/2010/main" val="1869761779"/>
+      </p:ext>
+    </p:extLst>
+  </p:cSld>
+  <p:clrMapOvr>
+    <a:masterClrMapping/>
+  </p:clrMapOvr>
+</p:sld>
+</file>
+
+<file path=ppt/slides/slide5.xml><?xml version="1.0" encoding="utf-8"?>
+<p:sld xmlns:a="http://schemas.openxmlformats.org/drawingml/2006/main" xmlns:r="http://schemas.openxmlformats.org/officeDocument/2006/relationships" xmlns:p="http://schemas.openxmlformats.org/presentationml/2006/main">
+  <p:cSld>
+    <p:spTree>
+      <p:nvGrpSpPr>
+        <p:cNvPr id="1" name=""/>
+        <p:cNvGrpSpPr/>
+        <p:nvPr/>
+      </p:nvGrpSpPr>
+      <p:grpSpPr>
+        <a:xfrm>
+          <a:off x="0" y="0"/>
+          <a:ext cx="0" cy="0"/>
+          <a:chOff x="0" y="0"/>
+          <a:chExt cx="0" cy="0"/>
+        </a:xfrm>
+      </p:grpSpPr>
+      <mc:AlternateContent xmlns:mc="http://schemas.openxmlformats.org/markup-compatibility/2006">
+        <mc:Choice xmlns:a14="http://schemas.microsoft.com/office/drawing/2010/main" Requires="a14">
+          <p:sp>
+            <p:nvSpPr>
+              <p:cNvPr id="4" name="Rectangle 3"/>
+              <p:cNvSpPr/>
+              <p:nvPr/>
+            </p:nvSpPr>
+            <p:spPr>
+              <a:xfrm>
+                <a:off x="3165141" y="488294"/>
+                <a:ext cx="948584" cy="2700472"/>
+              </a:xfrm>
+              <a:prstGeom prst="rect">
+                <a:avLst/>
+              </a:prstGeom>
+              <a:solidFill>
+                <a:schemeClr val="bg1"/>
+              </a:solidFill>
+            </p:spPr>
+            <p:style>
+              <a:lnRef idx="2">
+                <a:schemeClr val="accent1">
+                  <a:shade val="50000"/>
+                </a:schemeClr>
+              </a:lnRef>
+              <a:fillRef idx="1">
+                <a:schemeClr val="accent1"/>
+              </a:fillRef>
+              <a:effectRef idx="0">
+                <a:schemeClr val="accent1"/>
+              </a:effectRef>
+              <a:fontRef idx="minor">
+                <a:schemeClr val="lt1"/>
+              </a:fontRef>
+            </p:style>
+            <p:txBody>
+              <a:bodyPr rtlCol="0" anchor="ctr"/>
+              <a:lstStyle/>
+              <a:p>
+                <a:pPr algn="ctr"/>
+                <a:r>
+                  <a:rPr lang="en-US" sz="1600" dirty="0" smtClean="0">
+                    <a:solidFill>
+                      <a:schemeClr val="tx1"/>
+                    </a:solidFill>
+                  </a:rPr>
+                  <a:t>100010</a:t>
+                </a:r>
+                <a:endParaRPr lang="en-US" sz="1600" b="0" i="1" dirty="0" smtClean="0">
+                  <a:solidFill>
+                    <a:schemeClr val="tx1"/>
+                  </a:solidFill>
+                  <a:latin typeface="Cambria Math" panose="02040503050406030204" pitchFamily="18" charset="0"/>
+                </a:endParaRPr>
+              </a:p>
+              <a:p>
+                <a:pPr algn="ctr"/>
+                <a14:m>
+                  <m:oMathPara xmlns:m="http://schemas.openxmlformats.org/officeDocument/2006/math">
+                    <m:oMathParaPr>
+                      <m:jc m:val="centerGroup"/>
+                    </m:oMathParaPr>
+                    <m:oMath xmlns:m="http://schemas.openxmlformats.org/officeDocument/2006/math">
+                      <m:r>
+                        <a:rPr lang="en-US" sz="1600" b="0" i="1" smtClean="0">
+                          <a:solidFill>
+                            <a:schemeClr val="tx1"/>
+                          </a:solidFill>
+                          <a:latin typeface="Cambria Math" panose="02040503050406030204" pitchFamily="18" charset="0"/>
+                        </a:rPr>
+                        <m:t>000001</m:t>
+                      </m:r>
+                    </m:oMath>
+                  </m:oMathPara>
+                </a14:m>
+                <a:endParaRPr lang="en-US" sz="1600" b="0" dirty="0" smtClean="0">
+                  <a:solidFill>
+                    <a:schemeClr val="tx1"/>
+                  </a:solidFill>
+                </a:endParaRPr>
+              </a:p>
+              <a:p>
+                <a:pPr algn="ctr"/>
+                <a14:m>
+                  <m:oMathPara xmlns:m="http://schemas.openxmlformats.org/officeDocument/2006/math">
+                    <m:oMathParaPr>
+                      <m:jc m:val="centerGroup"/>
+                    </m:oMathParaPr>
+                    <m:oMath xmlns:m="http://schemas.openxmlformats.org/officeDocument/2006/math">
+                      <m:r>
+                        <a:rPr lang="en-US" sz="1600" b="0" i="1" smtClean="0">
+                          <a:solidFill>
+                            <a:schemeClr val="tx1"/>
+                          </a:solidFill>
+                          <a:latin typeface="Cambria Math" panose="02040503050406030204" pitchFamily="18" charset="0"/>
+                        </a:rPr>
+                        <m:t>000110</m:t>
+                      </m:r>
+                    </m:oMath>
+                  </m:oMathPara>
+                </a14:m>
+                <a:endParaRPr lang="en-US" sz="1600" b="0" dirty="0" smtClean="0">
+                  <a:solidFill>
+                    <a:schemeClr val="tx1"/>
+                  </a:solidFill>
+                </a:endParaRPr>
+              </a:p>
+              <a:p>
+                <a:pPr algn="ctr"/>
+                <a14:m>
+                  <m:oMathPara xmlns:m="http://schemas.openxmlformats.org/officeDocument/2006/math">
+                    <m:oMathParaPr>
+                      <m:jc m:val="centerGroup"/>
+                    </m:oMathParaPr>
+                    <m:oMath xmlns:m="http://schemas.openxmlformats.org/officeDocument/2006/math">
+                      <m:r>
+                        <a:rPr lang="en-US" sz="1600" b="0" i="1" smtClean="0">
+                          <a:solidFill>
+                            <a:schemeClr val="tx1"/>
+                          </a:solidFill>
+                          <a:latin typeface="Cambria Math" panose="02040503050406030204" pitchFamily="18" charset="0"/>
+                        </a:rPr>
+                        <m:t>000111</m:t>
+                      </m:r>
+                    </m:oMath>
+                  </m:oMathPara>
+                </a14:m>
+                <a:endParaRPr lang="en-US" sz="1600" b="0" dirty="0" smtClean="0">
+                  <a:solidFill>
+                    <a:schemeClr val="tx1"/>
+                  </a:solidFill>
+                </a:endParaRPr>
+              </a:p>
+              <a:p>
+                <a:pPr algn="ctr"/>
+                <a14:m>
+                  <m:oMathPara xmlns:m="http://schemas.openxmlformats.org/officeDocument/2006/math">
+                    <m:oMathParaPr>
+                      <m:jc m:val="centerGroup"/>
+                    </m:oMathParaPr>
+                    <m:oMath xmlns:m="http://schemas.openxmlformats.org/officeDocument/2006/math">
+                      <m:r>
+                        <a:rPr lang="en-US" sz="1600" b="0" i="1" smtClean="0">
+                          <a:solidFill>
+                            <a:schemeClr val="tx1"/>
+                          </a:solidFill>
+                          <a:latin typeface="Cambria Math" panose="02040503050406030204" pitchFamily="18" charset="0"/>
+                        </a:rPr>
+                        <m:t>011000</m:t>
+                      </m:r>
+                    </m:oMath>
+                  </m:oMathPara>
+                </a14:m>
+                <a:endParaRPr lang="en-US" sz="1600" b="0" dirty="0" smtClean="0">
+                  <a:solidFill>
+                    <a:schemeClr val="tx1"/>
+                  </a:solidFill>
+                </a:endParaRPr>
+              </a:p>
+              <a:p>
+                <a:pPr algn="ctr"/>
+                <a14:m>
+                  <m:oMathPara xmlns:m="http://schemas.openxmlformats.org/officeDocument/2006/math">
+                    <m:oMathParaPr>
+                      <m:jc m:val="centerGroup"/>
+                    </m:oMathParaPr>
+                    <m:oMath xmlns:m="http://schemas.openxmlformats.org/officeDocument/2006/math">
+                      <m:r>
+                        <a:rPr lang="en-US" sz="1600" i="1">
+                          <a:solidFill>
+                            <a:schemeClr val="tx1"/>
+                          </a:solidFill>
+                          <a:latin typeface="Cambria Math" panose="02040503050406030204" pitchFamily="18" charset="0"/>
+                        </a:rPr>
+                        <m:t>000011</m:t>
+                      </m:r>
+                    </m:oMath>
+                  </m:oMathPara>
+                </a14:m>
+                <a:endParaRPr lang="en-US" sz="1600" dirty="0" smtClean="0">
+                  <a:solidFill>
+                    <a:schemeClr val="tx1"/>
+                  </a:solidFill>
+                </a:endParaRPr>
+              </a:p>
+              <a:p>
+                <a:pPr algn="ctr"/>
+                <a:r>
+                  <a:rPr lang="en-US" sz="1600" dirty="0">
+                    <a:solidFill>
+                      <a:schemeClr val="tx1"/>
+                    </a:solidFill>
+                  </a:rPr>
+                  <a:t>100111</a:t>
+                </a:r>
+              </a:p>
+              <a:p>
+                <a:pPr algn="ctr"/>
+                <a:endParaRPr lang="en-US" sz="1600" dirty="0">
+                  <a:solidFill>
+                    <a:schemeClr val="tx1"/>
+                  </a:solidFill>
+                </a:endParaRPr>
+              </a:p>
+            </p:txBody>
+          </p:sp>
+        </mc:Choice>
+        <mc:Fallback>
+          <p:sp>
+            <p:nvSpPr>
+              <p:cNvPr id="4" name="Rectangle 3"/>
+              <p:cNvSpPr>
+                <a:spLocks noRot="1" noChangeAspect="1" noMove="1" noResize="1" noEditPoints="1" noAdjustHandles="1" noChangeArrowheads="1" noChangeShapeType="1" noTextEdit="1"/>
+              </p:cNvSpPr>
+              <p:nvPr/>
+            </p:nvSpPr>
+            <p:spPr>
+              <a:xfrm>
+                <a:off x="3165141" y="488294"/>
+                <a:ext cx="948584" cy="2700472"/>
+              </a:xfrm>
+              <a:prstGeom prst="rect">
+                <a:avLst/>
+              </a:prstGeom>
+              <a:blipFill rotWithShape="0">
+                <a:blip r:embed="rId2"/>
+                <a:stretch>
+                  <a:fillRect/>
+                </a:stretch>
+              </a:blipFill>
+            </p:spPr>
+            <p:txBody>
+              <a:bodyPr/>
+              <a:lstStyle/>
+              <a:p>
+                <a:r>
+                  <a:rPr lang="en-US">
+                    <a:noFill/>
+                  </a:rPr>
+                  <a:t> </a:t>
+                </a:r>
+              </a:p>
+            </p:txBody>
+          </p:sp>
+        </mc:Fallback>
+      </mc:AlternateContent>
+      <mc:AlternateContent xmlns:mc="http://schemas.openxmlformats.org/markup-compatibility/2006">
+        <mc:Choice xmlns:a14="http://schemas.microsoft.com/office/drawing/2010/main" Requires="a14">
+          <p:sp>
+            <p:nvSpPr>
+              <p:cNvPr id="5" name="Rectangle 4"/>
+              <p:cNvSpPr/>
+              <p:nvPr/>
+            </p:nvSpPr>
+            <p:spPr>
+              <a:xfrm>
+                <a:off x="4807538" y="488294"/>
+                <a:ext cx="948584" cy="2700472"/>
+              </a:xfrm>
+              <a:prstGeom prst="rect">
+                <a:avLst/>
+              </a:prstGeom>
+              <a:solidFill>
+                <a:schemeClr val="bg1"/>
+              </a:solidFill>
+            </p:spPr>
+            <p:style>
+              <a:lnRef idx="2">
+                <a:schemeClr val="accent1">
+                  <a:shade val="50000"/>
+                </a:schemeClr>
+              </a:lnRef>
+              <a:fillRef idx="1">
+                <a:schemeClr val="accent1"/>
+              </a:fillRef>
+              <a:effectRef idx="0">
+                <a:schemeClr val="accent1"/>
+              </a:effectRef>
+              <a:fontRef idx="minor">
+                <a:schemeClr val="lt1"/>
+              </a:fontRef>
+            </p:style>
+            <p:txBody>
+              <a:bodyPr rtlCol="0" anchor="ctr"/>
+              <a:lstStyle/>
+              <a:p>
+                <a:pPr algn="ctr"/>
+                <a14:m>
+                  <m:oMathPara xmlns:m="http://schemas.openxmlformats.org/officeDocument/2006/math">
+                    <m:oMathParaPr>
+                      <m:jc m:val="centerGroup"/>
+                    </m:oMathParaPr>
+                    <m:oMath xmlns:m="http://schemas.openxmlformats.org/officeDocument/2006/math">
+                      <m:r>
+                        <a:rPr lang="en-US" sz="1600" b="0" i="1" smtClean="0">
+                          <a:solidFill>
+                            <a:schemeClr val="tx1"/>
+                          </a:solidFill>
+                          <a:latin typeface="Cambria Math" panose="02040503050406030204" pitchFamily="18" charset="0"/>
+                        </a:rPr>
+                        <m:t>000001</m:t>
+                      </m:r>
+                    </m:oMath>
+                  </m:oMathPara>
+                </a14:m>
+                <a:endParaRPr lang="en-US" sz="1600" b="0" dirty="0" smtClean="0">
+                  <a:solidFill>
+                    <a:schemeClr val="tx1"/>
+                  </a:solidFill>
+                </a:endParaRPr>
+              </a:p>
+              <a:p>
+                <a:pPr algn="ctr"/>
+                <a14:m>
+                  <m:oMathPara xmlns:m="http://schemas.openxmlformats.org/officeDocument/2006/math">
+                    <m:oMathParaPr>
+                      <m:jc m:val="centerGroup"/>
+                    </m:oMathParaPr>
+                    <m:oMath xmlns:m="http://schemas.openxmlformats.org/officeDocument/2006/math">
+                      <m:r>
+                        <a:rPr lang="en-US" sz="1600" b="0" i="1" smtClean="0">
+                          <a:solidFill>
+                            <a:schemeClr val="tx1"/>
+                          </a:solidFill>
+                          <a:latin typeface="Cambria Math" panose="02040503050406030204" pitchFamily="18" charset="0"/>
+                        </a:rPr>
+                        <m:t>000011</m:t>
+                      </m:r>
+                    </m:oMath>
+                  </m:oMathPara>
+                </a14:m>
+                <a:endParaRPr lang="en-US" sz="1600" b="0" dirty="0" smtClean="0">
+                  <a:solidFill>
+                    <a:schemeClr val="tx1"/>
+                  </a:solidFill>
+                </a:endParaRPr>
+              </a:p>
+              <a:p>
+                <a:pPr algn="ctr"/>
+                <a14:m>
+                  <m:oMathPara xmlns:m="http://schemas.openxmlformats.org/officeDocument/2006/math">
+                    <m:oMathParaPr>
+                      <m:jc m:val="centerGroup"/>
+                    </m:oMathParaPr>
+                    <m:oMath xmlns:m="http://schemas.openxmlformats.org/officeDocument/2006/math">
+                      <m:r>
+                        <a:rPr lang="en-US" sz="1600" b="0" i="1" smtClean="0">
+                          <a:solidFill>
+                            <a:schemeClr val="tx1"/>
+                          </a:solidFill>
+                          <a:latin typeface="Cambria Math" panose="02040503050406030204" pitchFamily="18" charset="0"/>
+                        </a:rPr>
+                        <m:t>000110</m:t>
+                      </m:r>
+                    </m:oMath>
+                  </m:oMathPara>
+                </a14:m>
+                <a:endParaRPr lang="en-US" sz="1600" b="0" dirty="0" smtClean="0">
+                  <a:solidFill>
+                    <a:schemeClr val="tx1"/>
+                  </a:solidFill>
+                </a:endParaRPr>
+              </a:p>
+              <a:p>
+                <a:pPr algn="ctr"/>
+                <a14:m>
+                  <m:oMathPara xmlns:m="http://schemas.openxmlformats.org/officeDocument/2006/math">
+                    <m:oMathParaPr>
+                      <m:jc m:val="centerGroup"/>
+                    </m:oMathParaPr>
+                    <m:oMath xmlns:m="http://schemas.openxmlformats.org/officeDocument/2006/math">
+                      <m:r>
+                        <a:rPr lang="en-US" sz="1600" b="0" i="1" smtClean="0">
+                          <a:solidFill>
+                            <a:schemeClr val="tx1"/>
+                          </a:solidFill>
+                          <a:latin typeface="Cambria Math" panose="02040503050406030204" pitchFamily="18" charset="0"/>
+                        </a:rPr>
+                        <m:t>000111</m:t>
+                      </m:r>
+                    </m:oMath>
+                  </m:oMathPara>
+                </a14:m>
+                <a:endParaRPr lang="en-US" sz="1600" b="0" dirty="0" smtClean="0">
+                  <a:solidFill>
+                    <a:schemeClr val="tx1"/>
+                  </a:solidFill>
+                </a:endParaRPr>
+              </a:p>
+              <a:p>
+                <a:pPr algn="ctr"/>
+                <a14:m>
+                  <m:oMathPara xmlns:m="http://schemas.openxmlformats.org/officeDocument/2006/math">
+                    <m:oMathParaPr>
+                      <m:jc m:val="centerGroup"/>
+                    </m:oMathParaPr>
+                    <m:oMath xmlns:m="http://schemas.openxmlformats.org/officeDocument/2006/math">
+                      <m:r>
+                        <a:rPr lang="en-US" sz="1600" b="0" i="1" smtClean="0">
+                          <a:solidFill>
+                            <a:schemeClr val="tx1"/>
+                          </a:solidFill>
+                          <a:latin typeface="Cambria Math" panose="02040503050406030204" pitchFamily="18" charset="0"/>
+                        </a:rPr>
+                        <m:t>011000</m:t>
+                      </m:r>
+                    </m:oMath>
+                  </m:oMathPara>
+                </a14:m>
+                <a:endParaRPr lang="en-US" sz="1600" b="0" dirty="0" smtClean="0">
+                  <a:solidFill>
+                    <a:schemeClr val="tx1"/>
+                  </a:solidFill>
+                </a:endParaRPr>
+              </a:p>
+              <a:p>
+                <a:pPr algn="ctr"/>
+                <a:r>
+                  <a:rPr lang="en-US" sz="1600" dirty="0" smtClean="0">
+                    <a:solidFill>
+                      <a:schemeClr val="tx1"/>
+                    </a:solidFill>
+                  </a:rPr>
+                  <a:t>100010</a:t>
+                </a:r>
+              </a:p>
+              <a:p>
+                <a:pPr algn="ctr"/>
+                <a:r>
+                  <a:rPr lang="en-US" sz="1600" dirty="0" smtClean="0">
+                    <a:solidFill>
+                      <a:schemeClr val="tx1"/>
+                    </a:solidFill>
+                  </a:rPr>
+                  <a:t>100111</a:t>
+                </a:r>
+                <a:endParaRPr lang="en-US" sz="1600" dirty="0">
+                  <a:solidFill>
+                    <a:schemeClr val="tx1"/>
+                  </a:solidFill>
+                </a:endParaRPr>
+              </a:p>
+            </p:txBody>
+          </p:sp>
+        </mc:Choice>
+        <mc:Fallback>
+          <p:sp>
+            <p:nvSpPr>
+              <p:cNvPr id="5" name="Rectangle 4"/>
+              <p:cNvSpPr>
+                <a:spLocks noRot="1" noChangeAspect="1" noMove="1" noResize="1" noEditPoints="1" noAdjustHandles="1" noChangeArrowheads="1" noChangeShapeType="1" noTextEdit="1"/>
+              </p:cNvSpPr>
+              <p:nvPr/>
+            </p:nvSpPr>
+            <p:spPr>
+              <a:xfrm>
+                <a:off x="4807538" y="488294"/>
+                <a:ext cx="948584" cy="2700472"/>
+              </a:xfrm>
+              <a:prstGeom prst="rect">
+                <a:avLst/>
+              </a:prstGeom>
+              <a:blipFill rotWithShape="0">
+                <a:blip r:embed="rId3"/>
+                <a:stretch>
+                  <a:fillRect/>
+                </a:stretch>
+              </a:blipFill>
+            </p:spPr>
+            <p:txBody>
+              <a:bodyPr/>
+              <a:lstStyle/>
+              <a:p>
+                <a:r>
+                  <a:rPr lang="en-US">
+                    <a:noFill/>
+                  </a:rPr>
+                  <a:t> </a:t>
+                </a:r>
+              </a:p>
+            </p:txBody>
+          </p:sp>
+        </mc:Fallback>
+      </mc:AlternateContent>
+      <p:cxnSp>
+        <p:nvCxnSpPr>
+          <p:cNvPr id="6" name="Straight Arrow Connector 5"/>
+          <p:cNvCxnSpPr>
+            <a:endCxn id="5" idx="1"/>
+          </p:cNvCxnSpPr>
+          <p:nvPr/>
+        </p:nvCxnSpPr>
+        <p:spPr>
+          <a:xfrm>
+            <a:off x="4117829" y="1838530"/>
+            <a:ext cx="689709" cy="0"/>
+          </a:xfrm>
+          <a:prstGeom prst="straightConnector1">
+            <a:avLst/>
+          </a:prstGeom>
+          <a:ln>
+            <a:tailEnd type="triangle"/>
+          </a:ln>
+        </p:spPr>
+        <p:style>
+          <a:lnRef idx="1">
+            <a:schemeClr val="accent2"/>
+          </a:lnRef>
+          <a:fillRef idx="0">
+            <a:schemeClr val="accent2"/>
+          </a:fillRef>
+          <a:effectRef idx="0">
+            <a:schemeClr val="accent2"/>
+          </a:effectRef>
+          <a:fontRef idx="minor">
+            <a:schemeClr val="tx1"/>
+          </a:fontRef>
+        </p:style>
+      </p:cxnSp>
+      <p:sp>
+        <p:nvSpPr>
+          <p:cNvPr id="7" name="Rectangle 6"/>
+          <p:cNvSpPr/>
+          <p:nvPr/>
+        </p:nvSpPr>
+        <p:spPr>
+          <a:xfrm>
+            <a:off x="4198780" y="1376865"/>
+            <a:ext cx="514885" cy="338554"/>
+          </a:xfrm>
+          <a:prstGeom prst="rect">
+            <a:avLst/>
+          </a:prstGeom>
+          <a:noFill/>
+        </p:spPr>
+        <p:txBody>
+          <a:bodyPr wrap="none" lIns="91440" tIns="45720" rIns="91440" bIns="45720">
+            <a:spAutoFit/>
+          </a:bodyPr>
+          <a:lstStyle/>
+          <a:p>
+            <a:pPr algn="ctr"/>
+            <a:r>
+              <a:rPr lang="en-US" sz="1600" b="0" cap="none" spc="0" dirty="0" smtClean="0">
+                <a:ln w="0"/>
+                <a:solidFill>
+                  <a:schemeClr val="tx1"/>
+                </a:solidFill>
+                <a:effectLst>
+                  <a:outerShdw blurRad="38100" dist="19050" dir="2700000" algn="tl" rotWithShape="0">
+                    <a:schemeClr val="dk1">
+                      <a:alpha val="40000"/>
+                    </a:schemeClr>
+                  </a:outerShdw>
+                </a:effectLst>
+              </a:rPr>
+              <a:t>sort</a:t>
+            </a:r>
+            <a:endParaRPr lang="en-US" sz="1600" b="0" cap="none" spc="0" dirty="0">
+              <a:ln w="0"/>
+              <a:solidFill>
+                <a:schemeClr val="tx1"/>
+              </a:solidFill>
+              <a:effectLst>
+                <a:outerShdw blurRad="38100" dist="19050" dir="2700000" algn="tl" rotWithShape="0">
+                  <a:schemeClr val="dk1">
+                    <a:alpha val="40000"/>
+                  </a:schemeClr>
+                </a:outerShdw>
+              </a:effectLst>
+            </a:endParaRPr>
+          </a:p>
+        </p:txBody>
+      </p:sp>
+      <p:sp>
+        <p:nvSpPr>
+          <p:cNvPr id="8" name="Oval Callout 7"/>
+          <p:cNvSpPr/>
+          <p:nvPr/>
+        </p:nvSpPr>
+        <p:spPr>
+          <a:xfrm>
+            <a:off x="4102042" y="241891"/>
+            <a:ext cx="1914378" cy="598205"/>
+          </a:xfrm>
+          <a:prstGeom prst="wedgeEllipseCallout">
+            <a:avLst>
+              <a:gd name="adj1" fmla="val -49374"/>
+              <a:gd name="adj2" fmla="val 73659"/>
+            </a:avLst>
+          </a:prstGeom>
+          <a:solidFill>
+            <a:schemeClr val="bg1"/>
+          </a:solidFill>
+        </p:spPr>
+        <p:style>
+          <a:lnRef idx="2">
+            <a:schemeClr val="accent1">
+              <a:shade val="50000"/>
+            </a:schemeClr>
+          </a:lnRef>
+          <a:fillRef idx="1">
+            <a:schemeClr val="accent1"/>
+          </a:fillRef>
+          <a:effectRef idx="0">
+            <a:schemeClr val="accent1"/>
+          </a:effectRef>
+          <a:fontRef idx="minor">
+            <a:schemeClr val="lt1"/>
+          </a:fontRef>
+        </p:style>
+        <p:txBody>
+          <a:bodyPr rtlCol="0" anchor="ctr"/>
+          <a:lstStyle/>
+          <a:p>
+            <a:pPr algn="ctr"/>
+            <a:r>
+              <a:rPr lang="en-US" sz="1600" dirty="0" smtClean="0">
+                <a:solidFill>
+                  <a:schemeClr val="tx1"/>
+                </a:solidFill>
+              </a:rPr>
+              <a:t>Pseudo-End Points</a:t>
+            </a:r>
+            <a:endParaRPr lang="en-US" sz="1600" dirty="0">
+              <a:solidFill>
+                <a:schemeClr val="tx1"/>
+              </a:solidFill>
+            </a:endParaRPr>
+          </a:p>
+        </p:txBody>
+      </p:sp>
+      <p:sp>
+        <p:nvSpPr>
+          <p:cNvPr id="12" name="Rectangle 11"/>
+          <p:cNvSpPr/>
+          <p:nvPr/>
+        </p:nvSpPr>
+        <p:spPr>
+          <a:xfrm>
+            <a:off x="6444170" y="1050264"/>
+            <a:ext cx="1650412" cy="1613556"/>
+          </a:xfrm>
+          <a:prstGeom prst="rect">
+            <a:avLst/>
+          </a:prstGeom>
+          <a:solidFill>
+            <a:schemeClr val="bg1"/>
+          </a:solidFill>
+        </p:spPr>
+        <p:style>
+          <a:lnRef idx="2">
+            <a:schemeClr val="accent1">
+              <a:shade val="50000"/>
+            </a:schemeClr>
+          </a:lnRef>
+          <a:fillRef idx="1">
+            <a:schemeClr val="accent1"/>
+          </a:fillRef>
+          <a:effectRef idx="0">
+            <a:schemeClr val="accent1"/>
+          </a:effectRef>
+          <a:fontRef idx="minor">
+            <a:schemeClr val="lt1"/>
+          </a:fontRef>
+        </p:style>
+        <p:txBody>
+          <a:bodyPr rtlCol="0" anchor="ctr"/>
+          <a:lstStyle/>
+          <a:p>
+            <a:pPr algn="ctr"/>
+            <a:r>
+              <a:rPr lang="en-US" sz="1600" dirty="0" smtClean="0">
+                <a:solidFill>
+                  <a:schemeClr val="tx1"/>
+                </a:solidFill>
+              </a:rPr>
+              <a:t>Pre-computed Table</a:t>
+            </a:r>
+            <a:endParaRPr lang="en-US" sz="1600" dirty="0">
+              <a:solidFill>
+                <a:schemeClr val="tx1"/>
+              </a:solidFill>
+            </a:endParaRPr>
+          </a:p>
+        </p:txBody>
+      </p:sp>
+      <p:sp>
+        <p:nvSpPr>
+          <p:cNvPr id="14" name="Rectangle 13"/>
+          <p:cNvSpPr/>
+          <p:nvPr/>
+        </p:nvSpPr>
+        <p:spPr>
+          <a:xfrm>
+            <a:off x="5657557" y="1554530"/>
+            <a:ext cx="885179" cy="338554"/>
+          </a:xfrm>
+          <a:prstGeom prst="rect">
+            <a:avLst/>
+          </a:prstGeom>
+          <a:noFill/>
+        </p:spPr>
+        <p:txBody>
+          <a:bodyPr wrap="none" lIns="91440" tIns="45720" rIns="91440" bIns="45720">
+            <a:spAutoFit/>
+          </a:bodyPr>
+          <a:lstStyle/>
+          <a:p>
+            <a:pPr algn="ctr"/>
+            <a:r>
+              <a:rPr lang="en-US" sz="1600" b="0" cap="none" spc="0" dirty="0" smtClean="0">
+                <a:ln w="0"/>
+                <a:solidFill>
+                  <a:schemeClr val="tx1"/>
+                </a:solidFill>
+                <a:effectLst>
+                  <a:outerShdw blurRad="38100" dist="19050" dir="2700000" algn="tl" rotWithShape="0">
+                    <a:schemeClr val="dk1">
+                      <a:alpha val="40000"/>
+                    </a:schemeClr>
+                  </a:outerShdw>
+                </a:effectLst>
+              </a:rPr>
+              <a:t>Collision</a:t>
+            </a:r>
+            <a:endParaRPr lang="en-US" sz="1600" b="0" cap="none" spc="0" dirty="0">
+              <a:ln w="0"/>
+              <a:solidFill>
+                <a:schemeClr val="tx1"/>
+              </a:solidFill>
+              <a:effectLst>
+                <a:outerShdw blurRad="38100" dist="19050" dir="2700000" algn="tl" rotWithShape="0">
+                  <a:schemeClr val="dk1">
+                    <a:alpha val="40000"/>
+                  </a:schemeClr>
+                </a:outerShdw>
+              </a:effectLst>
+            </a:endParaRPr>
+          </a:p>
+        </p:txBody>
+      </p:sp>
+      <p:sp>
+        <p:nvSpPr>
+          <p:cNvPr id="16" name="Rectangle 15"/>
+          <p:cNvSpPr/>
+          <p:nvPr/>
+        </p:nvSpPr>
+        <p:spPr>
+          <a:xfrm>
+            <a:off x="5769248" y="1826375"/>
+            <a:ext cx="737639" cy="338554"/>
+          </a:xfrm>
+          <a:prstGeom prst="rect">
+            <a:avLst/>
+          </a:prstGeom>
+          <a:noFill/>
+        </p:spPr>
+        <p:txBody>
+          <a:bodyPr wrap="none" lIns="91440" tIns="45720" rIns="91440" bIns="45720">
+            <a:spAutoFit/>
+          </a:bodyPr>
+          <a:lstStyle/>
+          <a:p>
+            <a:pPr algn="ctr"/>
+            <a:r>
+              <a:rPr lang="en-US" sz="1600" b="0" cap="none" spc="0" dirty="0" smtClean="0">
+                <a:ln w="0"/>
+                <a:solidFill>
+                  <a:schemeClr val="tx1"/>
+                </a:solidFill>
+                <a:effectLst>
+                  <a:outerShdw blurRad="38100" dist="19050" dir="2700000" algn="tl" rotWithShape="0">
+                    <a:schemeClr val="dk1">
+                      <a:alpha val="40000"/>
+                    </a:schemeClr>
+                  </a:outerShdw>
+                </a:effectLst>
+              </a:rPr>
+              <a:t>Detect</a:t>
+            </a:r>
+            <a:endParaRPr lang="en-US" sz="1600" b="0" cap="none" spc="0" dirty="0">
+              <a:ln w="0"/>
+              <a:solidFill>
+                <a:schemeClr val="tx1"/>
+              </a:solidFill>
+              <a:effectLst>
+                <a:outerShdw blurRad="38100" dist="19050" dir="2700000" algn="tl" rotWithShape="0">
+                  <a:schemeClr val="dk1">
+                    <a:alpha val="40000"/>
+                  </a:schemeClr>
+                </a:outerShdw>
+              </a:effectLst>
+            </a:endParaRPr>
+          </a:p>
+        </p:txBody>
+      </p:sp>
+      <p:cxnSp>
+        <p:nvCxnSpPr>
+          <p:cNvPr id="19" name="Straight Arrow Connector 18"/>
+          <p:cNvCxnSpPr>
+            <a:stCxn id="12" idx="1"/>
+          </p:cNvCxnSpPr>
+          <p:nvPr/>
+        </p:nvCxnSpPr>
+        <p:spPr>
+          <a:xfrm flipH="1" flipV="1">
+            <a:off x="5754337" y="1857033"/>
+            <a:ext cx="689833" cy="9"/>
+          </a:xfrm>
+          <a:prstGeom prst="straightConnector1">
+            <a:avLst/>
+          </a:prstGeom>
+          <a:ln>
+            <a:tailEnd type="triangle"/>
+          </a:ln>
+        </p:spPr>
+        <p:style>
+          <a:lnRef idx="1">
+            <a:schemeClr val="accent2"/>
+          </a:lnRef>
+          <a:fillRef idx="0">
+            <a:schemeClr val="accent2"/>
+          </a:fillRef>
+          <a:effectRef idx="0">
+            <a:schemeClr val="accent2"/>
+          </a:effectRef>
+          <a:fontRef idx="minor">
+            <a:schemeClr val="tx1"/>
+          </a:fontRef>
+        </p:style>
+      </p:cxnSp>
+    </p:spTree>
+    <p:extLst>
+      <p:ext uri="{BB962C8B-B14F-4D97-AF65-F5344CB8AC3E}">
+        <p14:creationId xmlns:p14="http://schemas.microsoft.com/office/powerpoint/2010/main" val="2375386195"/>
+      </p:ext>
+    </p:extLst>
+  </p:cSld>
+  <p:clrMapOvr>
+    <a:masterClrMapping/>
+  </p:clrMapOvr>
+</p:sld>
+</file>
+
 <file path=ppt/theme/theme1.xml><?xml version="1.0" encoding="utf-8"?>
 <a:theme xmlns:a="http://schemas.openxmlformats.org/drawingml/2006/main" name="Office Theme">
   <a:themeElements>

</xml_diff>